<commit_message>
add steps 3 and 4 + discovering objects section of chapter 4
</commit_message>
<xml_diff>
--- a/images_editables/poodr_image_editables.pptx
+++ b/images_editables/poodr_image_editables.pptx
@@ -6,6 +6,7 @@
   </p:sldMasterIdLst>
   <p:sldIdLst>
     <p:sldId id="256" r:id="rId2"/>
+    <p:sldId id="257" r:id="rId3"/>
   </p:sldIdLst>
   <p:sldSz cx="12192000" cy="6858000"/>
   <p:notesSz cx="6858000" cy="9144000"/>
@@ -2972,8 +2973,8 @@
         </p:nvSpPr>
         <p:spPr>
           <a:xfrm>
-            <a:off x="263602" y="4848811"/>
-            <a:ext cx="3308724" cy="1169551"/>
+            <a:off x="263602" y="4793056"/>
+            <a:ext cx="3308724" cy="830997"/>
           </a:xfrm>
           <a:prstGeom prst="rect">
             <a:avLst/>
@@ -2987,7 +2988,7 @@
           <a:lstStyle/>
           <a:p>
             <a:r>
-              <a:rPr lang="en-AU" sz="1400" b="1" dirty="0" smtClean="0"/>
+              <a:rPr lang="en-AU" sz="1200" b="1" dirty="0" smtClean="0"/>
               <a:t>Wrongs:</a:t>
             </a:r>
           </a:p>
@@ -2997,15 +2998,15 @@
               <a:buChar char="•"/>
             </a:pPr>
             <a:r>
-              <a:rPr lang="en-AU" sz="1400" dirty="0" smtClean="0"/>
-              <a:t>Trip tells mechanic </a:t>
-            </a:r>
-            <a:r>
-              <a:rPr lang="en-AU" sz="1400" b="1" dirty="0" smtClean="0"/>
+              <a:rPr lang="en-AU" sz="1200" dirty="0" smtClean="0"/>
+              <a:t>Trip tells Mechanic </a:t>
+            </a:r>
+            <a:r>
+              <a:rPr lang="en-AU" sz="1200" b="1" dirty="0" smtClean="0"/>
               <a:t>how </a:t>
             </a:r>
             <a:r>
-              <a:rPr lang="en-AU" sz="1400" dirty="0" smtClean="0"/>
+              <a:rPr lang="en-AU" sz="1200" dirty="0" smtClean="0"/>
               <a:t>to prepare each bicycle</a:t>
             </a:r>
           </a:p>
@@ -3015,11 +3016,11 @@
               <a:buChar char="•"/>
             </a:pPr>
             <a:r>
-              <a:rPr lang="en-AU" sz="1400" dirty="0" smtClean="0"/>
+              <a:rPr lang="en-AU" sz="1200" dirty="0" smtClean="0"/>
               <a:t>Trip has a </a:t>
             </a:r>
             <a:r>
-              <a:rPr lang="en-AU" sz="1400" b="1" dirty="0" smtClean="0"/>
+              <a:rPr lang="en-AU" sz="1200" b="1" dirty="0" smtClean="0"/>
               <a:t>large context</a:t>
             </a:r>
           </a:p>
@@ -3029,14 +3030,14 @@
               <a:buChar char="•"/>
             </a:pPr>
             <a:r>
-              <a:rPr lang="en-AU" sz="1400" dirty="0" smtClean="0"/>
+              <a:rPr lang="en-AU" sz="1200" dirty="0" smtClean="0"/>
               <a:t>Mechanic has a </a:t>
             </a:r>
             <a:r>
-              <a:rPr lang="en-AU" sz="1400" b="1" dirty="0" smtClean="0"/>
+              <a:rPr lang="en-AU" sz="1200" b="1" dirty="0" smtClean="0"/>
               <a:t>big public interface</a:t>
             </a:r>
-            <a:endParaRPr lang="en-AU" sz="1400" dirty="0" smtClean="0"/>
+            <a:endParaRPr lang="en-AU" sz="1200" dirty="0" smtClean="0"/>
           </a:p>
         </p:txBody>
       </p:sp>
@@ -3188,8 +3189,8 @@
         </p:nvSpPr>
         <p:spPr>
           <a:xfrm>
-            <a:off x="3908134" y="4316581"/>
-            <a:ext cx="4511039" cy="2462213"/>
+            <a:off x="3908134" y="4160467"/>
+            <a:ext cx="4511039" cy="2677656"/>
           </a:xfrm>
           <a:prstGeom prst="rect">
             <a:avLst/>
@@ -3203,7 +3204,7 @@
           <a:lstStyle/>
           <a:p>
             <a:r>
-              <a:rPr lang="en-AU" sz="1400" b="1" dirty="0" smtClean="0"/>
+              <a:rPr lang="en-AU" sz="1200" b="1" dirty="0" smtClean="0"/>
               <a:t>Rights:</a:t>
             </a:r>
           </a:p>
@@ -3213,25 +3214,16 @@
               <a:buChar char="•"/>
             </a:pPr>
             <a:r>
-              <a:rPr lang="en-AU" sz="1400" dirty="0" smtClean="0"/>
-              <a:t>Trip tells mechanic </a:t>
-            </a:r>
-            <a:r>
-              <a:rPr lang="en-AU" sz="1400" b="1" dirty="0" smtClean="0"/>
+              <a:rPr lang="en-AU" sz="1200" dirty="0" smtClean="0"/>
+              <a:t>Trip tells Mechanic </a:t>
+            </a:r>
+            <a:r>
+              <a:rPr lang="en-AU" sz="1200" b="1" dirty="0" smtClean="0"/>
               <a:t>what </a:t>
             </a:r>
             <a:r>
-              <a:rPr lang="en-AU" sz="1400" dirty="0" smtClean="0"/>
-              <a:t>to do (not how)</a:t>
-            </a:r>
-          </a:p>
-          <a:p>
-            <a:endParaRPr lang="en-AU" sz="1400" dirty="0" smtClean="0"/>
-          </a:p>
-          <a:p>
-            <a:r>
-              <a:rPr lang="en-AU" sz="1400" b="1" dirty="0" smtClean="0"/>
-              <a:t>Wrongs:</a:t>
+              <a:rPr lang="en-AU" sz="1200" dirty="0" smtClean="0"/>
+              <a:t>to do, not how (sort of).</a:t>
             </a:r>
           </a:p>
           <a:p>
@@ -3240,8 +3232,21 @@
               <a:buChar char="•"/>
             </a:pPr>
             <a:r>
-              <a:rPr lang="en-AU" sz="1400" dirty="0" smtClean="0"/>
-              <a:t>Trip still knows what mechanic does (dependency)</a:t>
+              <a:rPr lang="en-AU" sz="1200" dirty="0" smtClean="0"/>
+              <a:t>Trip and Mechanic have </a:t>
+            </a:r>
+            <a:r>
+              <a:rPr lang="en-AU" sz="1200" b="1" dirty="0" smtClean="0"/>
+              <a:t>small public interfaces</a:t>
+            </a:r>
+          </a:p>
+          <a:p>
+            <a:endParaRPr lang="en-AU" sz="1200" dirty="0" smtClean="0"/>
+          </a:p>
+          <a:p>
+            <a:r>
+              <a:rPr lang="en-AU" sz="1200" b="1" dirty="0" smtClean="0"/>
+              <a:t>Wrongs:</a:t>
             </a:r>
           </a:p>
           <a:p>
@@ -3250,24 +3255,8 @@
               <a:buChar char="•"/>
             </a:pPr>
             <a:r>
-              <a:rPr lang="en-AU" sz="1400" dirty="0" smtClean="0"/>
-              <a:t>Trip’s context still needs </a:t>
-            </a:r>
-            <a:r>
-              <a:rPr lang="en-AU" sz="1400" i="1" dirty="0" smtClean="0"/>
-              <a:t>someone</a:t>
-            </a:r>
-            <a:r>
-              <a:rPr lang="en-AU" sz="1400" dirty="0" smtClean="0"/>
-              <a:t> to prepare bicycles </a:t>
-            </a:r>
-            <a:r>
-              <a:rPr lang="en-AU" sz="1400" b="1" dirty="0" smtClean="0"/>
-              <a:t>always</a:t>
-            </a:r>
-            <a:r>
-              <a:rPr lang="en-AU" sz="1400" dirty="0" smtClean="0"/>
-              <a:t>.</a:t>
+              <a:rPr lang="en-AU" sz="1200" dirty="0" smtClean="0"/>
+              <a:t>Trip still knows what Mechanic does (dependency)</a:t>
             </a:r>
           </a:p>
           <a:p>
@@ -3276,8 +3265,24 @@
               <a:buChar char="•"/>
             </a:pPr>
             <a:r>
-              <a:rPr lang="en-AU" sz="1400" dirty="0" smtClean="0"/>
-              <a:t>If there was trip that didn’t need bicycle preparation it would be wrong.</a:t>
+              <a:rPr lang="en-AU" sz="1200" dirty="0" smtClean="0"/>
+              <a:t>Telling </a:t>
+            </a:r>
+            <a:r>
+              <a:rPr lang="en-AU" sz="1200" b="1" dirty="0" smtClean="0"/>
+              <a:t>prepare_bicycles</a:t>
+            </a:r>
+            <a:r>
+              <a:rPr lang="en-AU" sz="1200" dirty="0" smtClean="0"/>
+              <a:t> is still telling </a:t>
+            </a:r>
+            <a:r>
+              <a:rPr lang="en-AU" sz="1200" b="1" dirty="0" smtClean="0"/>
+              <a:t>how </a:t>
+            </a:r>
+            <a:r>
+              <a:rPr lang="en-AU" sz="1200" dirty="0" smtClean="0"/>
+              <a:t>to prepare a trip (Mechanic could do more than only prepare_bicycles for a trip).</a:t>
             </a:r>
           </a:p>
           <a:p>
@@ -3286,21 +3291,57 @@
               <a:buChar char="•"/>
             </a:pPr>
             <a:r>
-              <a:rPr lang="en-AU" sz="1400" dirty="0" smtClean="0"/>
-              <a:t>Need to modify trip if </a:t>
-            </a:r>
-            <a:r>
-              <a:rPr lang="en-AU" sz="1400" b="1" dirty="0" smtClean="0"/>
-              <a:t>other things need to get prepared</a:t>
-            </a:r>
-            <a:endParaRPr lang="en-AU" sz="1400" dirty="0" smtClean="0"/>
+              <a:rPr lang="en-AU" sz="1200" dirty="0" smtClean="0"/>
+              <a:t>Trip’s context still needs </a:t>
+            </a:r>
+            <a:r>
+              <a:rPr lang="en-AU" sz="1200" i="1" dirty="0" smtClean="0"/>
+              <a:t>someone</a:t>
+            </a:r>
+            <a:r>
+              <a:rPr lang="en-AU" sz="1200" dirty="0" smtClean="0"/>
+              <a:t> to prepare bicycles </a:t>
+            </a:r>
+            <a:r>
+              <a:rPr lang="en-AU" sz="1200" b="1" dirty="0" smtClean="0"/>
+              <a:t>always</a:t>
+            </a:r>
+            <a:r>
+              <a:rPr lang="en-AU" sz="1200" dirty="0" smtClean="0"/>
+              <a:t>.</a:t>
+            </a:r>
+          </a:p>
+          <a:p>
+            <a:pPr marL="452438" lvl="1" indent="-166688">
+              <a:buFont typeface="Arial" charset="0"/>
+              <a:buChar char="•"/>
+            </a:pPr>
+            <a:r>
+              <a:rPr lang="en-AU" sz="1200" dirty="0" smtClean="0"/>
+              <a:t>If there was trip that didn’t need bicycle preparation it would be wrong.</a:t>
+            </a:r>
           </a:p>
           <a:p>
             <a:pPr marL="171450" indent="-171450">
               <a:buFont typeface="Arial" charset="0"/>
               <a:buChar char="•"/>
             </a:pPr>
-            <a:endParaRPr lang="en-AU" sz="1400" dirty="0" smtClean="0"/>
+            <a:r>
+              <a:rPr lang="en-AU" sz="1200" dirty="0" smtClean="0"/>
+              <a:t>Need to modify Trip if </a:t>
+            </a:r>
+            <a:r>
+              <a:rPr lang="en-AU" sz="1200" b="1" dirty="0" smtClean="0"/>
+              <a:t>other things need to get prepared</a:t>
+            </a:r>
+            <a:endParaRPr lang="en-AU" sz="1200" dirty="0" smtClean="0"/>
+          </a:p>
+          <a:p>
+            <a:pPr marL="171450" indent="-171450">
+              <a:buFont typeface="Arial" charset="0"/>
+              <a:buChar char="•"/>
+            </a:pPr>
+            <a:endParaRPr lang="en-AU" sz="1200" dirty="0" smtClean="0"/>
           </a:p>
         </p:txBody>
       </p:sp>
@@ -3382,8 +3423,8 @@
         </p:nvSpPr>
         <p:spPr>
           <a:xfrm>
-            <a:off x="8419172" y="4313122"/>
-            <a:ext cx="3431651" cy="2462213"/>
+            <a:off x="8564135" y="4160467"/>
+            <a:ext cx="3431651" cy="1938992"/>
           </a:xfrm>
           <a:prstGeom prst="rect">
             <a:avLst/>
@@ -3397,7 +3438,7 @@
           <a:lstStyle/>
           <a:p>
             <a:r>
-              <a:rPr lang="en-AU" sz="1400" b="1" dirty="0" smtClean="0"/>
+              <a:rPr lang="en-AU" sz="1200" b="1" dirty="0" smtClean="0"/>
               <a:t>Rights:</a:t>
             </a:r>
           </a:p>
@@ -3407,14 +3448,33 @@
               <a:buChar char="•"/>
             </a:pPr>
             <a:r>
-              <a:rPr lang="en-AU" sz="1400" dirty="0" smtClean="0"/>
-              <a:t>Dependency injection in </a:t>
-            </a:r>
-            <a:r>
-              <a:rPr lang="en-AU" sz="1400" i="1" dirty="0" err="1" smtClean="0"/>
-              <a:t>prepare_trip</a:t>
-            </a:r>
-            <a:endParaRPr lang="en-AU" sz="1400" i="1" dirty="0" smtClean="0"/>
+              <a:rPr lang="en-AU" sz="1200" dirty="0" smtClean="0"/>
+              <a:t>Trip is </a:t>
+            </a:r>
+            <a:r>
+              <a:rPr lang="en-AU" sz="1200" b="1" dirty="0" smtClean="0"/>
+              <a:t>not</a:t>
+            </a:r>
+            <a:r>
+              <a:rPr lang="en-AU" sz="1200" dirty="0" smtClean="0"/>
+              <a:t> telling Mechanic </a:t>
+            </a:r>
+            <a:r>
+              <a:rPr lang="en-AU" sz="1200" b="1" dirty="0" smtClean="0"/>
+              <a:t>how. </a:t>
+            </a:r>
+            <a:r>
+              <a:rPr lang="en-AU" sz="1200" dirty="0" smtClean="0"/>
+              <a:t>Trip </a:t>
+            </a:r>
+            <a:r>
+              <a:rPr lang="en-AU" sz="1200" b="1" dirty="0" smtClean="0"/>
+              <a:t>trusts </a:t>
+            </a:r>
+            <a:r>
+              <a:rPr lang="en-AU" sz="1200" dirty="0" smtClean="0"/>
+              <a:t>Mechanic to do its part.</a:t>
+            </a:r>
           </a:p>
           <a:p>
             <a:pPr marL="171450" indent="-171450">
@@ -3422,12 +3482,16 @@
               <a:buChar char="•"/>
             </a:pPr>
             <a:r>
-              <a:rPr lang="en-AU" sz="1400" dirty="0" smtClean="0"/>
-              <a:t>Trip and mechanic have </a:t>
-            </a:r>
-            <a:r>
-              <a:rPr lang="en-AU" sz="1400" b="1" dirty="0" smtClean="0"/>
-              <a:t>small public interfaces</a:t>
+              <a:rPr lang="en-AU" sz="1200" b="1" dirty="0" smtClean="0"/>
+              <a:t>Dependency injection</a:t>
+            </a:r>
+            <a:r>
+              <a:rPr lang="en-AU" sz="1200" dirty="0" smtClean="0"/>
+              <a:t> in </a:t>
+            </a:r>
+            <a:r>
+              <a:rPr lang="en-AU" sz="1200" i="1" dirty="0" smtClean="0"/>
+              <a:t>prepare_trip</a:t>
             </a:r>
           </a:p>
           <a:p>
@@ -3436,23 +3500,23 @@
               <a:buChar char="•"/>
             </a:pPr>
             <a:r>
-              <a:rPr lang="en-AU" sz="1400" dirty="0" smtClean="0"/>
+              <a:rPr lang="en-AU" sz="1200" dirty="0" smtClean="0"/>
               <a:t>Trip could have an array of </a:t>
             </a:r>
             <a:r>
-              <a:rPr lang="en-AU" sz="1400" i="1" dirty="0" smtClean="0"/>
+              <a:rPr lang="en-AU" sz="1200" i="1" dirty="0" smtClean="0"/>
               <a:t>preparers </a:t>
             </a:r>
             <a:r>
-              <a:rPr lang="en-AU" sz="1400" dirty="0" smtClean="0"/>
+              <a:rPr lang="en-AU" sz="1200" dirty="0" smtClean="0"/>
               <a:t>and could call </a:t>
             </a:r>
             <a:r>
-              <a:rPr lang="en-AU" sz="1400" i="1" dirty="0" err="1" smtClean="0"/>
+              <a:rPr lang="en-AU" sz="1200" i="1" dirty="0" smtClean="0"/>
               <a:t>prepare_trip</a:t>
             </a:r>
             <a:r>
-              <a:rPr lang="en-AU" sz="1400" dirty="0" smtClean="0"/>
+              <a:rPr lang="en-AU" sz="1200" dirty="0" smtClean="0"/>
               <a:t> on each.</a:t>
             </a:r>
           </a:p>
@@ -3462,8 +3526,8 @@
               <a:buChar char="•"/>
             </a:pPr>
             <a:r>
-              <a:rPr lang="en-AU" sz="1400" dirty="0" smtClean="0"/>
-              <a:t>It is easy to extend Trip.</a:t>
+              <a:rPr lang="en-AU" sz="1200" dirty="0" smtClean="0"/>
+              <a:t>It is easy to extend Trip</a:t>
             </a:r>
           </a:p>
           <a:p>
@@ -3472,8 +3536,8 @@
               <a:buChar char="•"/>
             </a:pPr>
             <a:r>
-              <a:rPr lang="en-AU" sz="1400" dirty="0" smtClean="0"/>
-              <a:t>Extending Trip requires no modification of Trip.</a:t>
+              <a:rPr lang="en-AU" sz="1200" dirty="0" smtClean="0"/>
+              <a:t>Extending Trip requires no modification of Trip</a:t>
             </a:r>
           </a:p>
           <a:p>
@@ -3482,16 +3546,16 @@
               <a:buChar char="•"/>
             </a:pPr>
             <a:r>
-              <a:rPr lang="en-AU" sz="1400" dirty="0" smtClean="0"/>
+              <a:rPr lang="en-AU" sz="1200" dirty="0" smtClean="0"/>
               <a:t>Trip trusts each </a:t>
             </a:r>
             <a:r>
-              <a:rPr lang="en-AU" sz="1400" i="1" dirty="0" smtClean="0"/>
+              <a:rPr lang="en-AU" sz="1200" i="1" dirty="0" smtClean="0"/>
               <a:t>preparer</a:t>
             </a:r>
             <a:r>
-              <a:rPr lang="en-AU" sz="1400" dirty="0" smtClean="0"/>
-              <a:t> to do its part.</a:t>
+              <a:rPr lang="en-AU" sz="1200" dirty="0" smtClean="0"/>
+              <a:t> to do its part</a:t>
             </a:r>
           </a:p>
         </p:txBody>
@@ -3500,6 +3564,470 @@
     <p:extLst>
       <p:ext uri="{BB962C8B-B14F-4D97-AF65-F5344CB8AC3E}">
         <p14:creationId xmlns:p14="http://schemas.microsoft.com/office/powerpoint/2010/main" val="1636655323"/>
+      </p:ext>
+    </p:extLst>
+  </p:cSld>
+  <p:clrMapOvr>
+    <a:masterClrMapping/>
+  </p:clrMapOvr>
+</p:sld>
+</file>
+
+<file path=ppt/slides/slide2.xml><?xml version="1.0" encoding="utf-8"?>
+<p:sld xmlns:a="http://schemas.openxmlformats.org/drawingml/2006/main" xmlns:r="http://schemas.openxmlformats.org/officeDocument/2006/relationships" xmlns:p="http://schemas.openxmlformats.org/presentationml/2006/main">
+  <p:cSld>
+    <p:spTree>
+      <p:nvGrpSpPr>
+        <p:cNvPr id="1" name=""/>
+        <p:cNvGrpSpPr/>
+        <p:nvPr/>
+      </p:nvGrpSpPr>
+      <p:grpSpPr>
+        <a:xfrm>
+          <a:off x="0" y="0"/>
+          <a:ext cx="0" cy="0"/>
+          <a:chOff x="0" y="0"/>
+          <a:chExt cx="0" cy="0"/>
+        </a:xfrm>
+      </p:grpSpPr>
+      <p:sp>
+        <p:nvSpPr>
+          <p:cNvPr id="5" name="CuadroTexto 4"/>
+          <p:cNvSpPr txBox="1"/>
+          <p:nvPr/>
+        </p:nvSpPr>
+        <p:spPr>
+          <a:xfrm>
+            <a:off x="334631" y="3083665"/>
+            <a:ext cx="3308724" cy="461665"/>
+          </a:xfrm>
+          <a:prstGeom prst="rect">
+            <a:avLst/>
+          </a:prstGeom>
+          <a:noFill/>
+        </p:spPr>
+        <p:txBody>
+          <a:bodyPr wrap="square" rtlCol="0">
+            <a:spAutoFit/>
+          </a:bodyPr>
+          <a:lstStyle/>
+          <a:p>
+            <a:r>
+              <a:rPr lang="en-AU" sz="1200" b="1" dirty="0" smtClean="0"/>
+              <a:t>Wrongs:</a:t>
+            </a:r>
+          </a:p>
+          <a:p>
+            <a:pPr marL="171450" indent="-171450">
+              <a:buFont typeface="Arial" charset="0"/>
+              <a:buChar char="•"/>
+            </a:pPr>
+            <a:r>
+              <a:rPr lang="en-AU" sz="1200" dirty="0" smtClean="0"/>
+              <a:t>Trip has </a:t>
+            </a:r>
+            <a:r>
+              <a:rPr lang="en-AU" sz="1200" b="1" dirty="0" smtClean="0"/>
+              <a:t>too much responsibility</a:t>
+            </a:r>
+          </a:p>
+        </p:txBody>
+      </p:sp>
+      <p:sp>
+        <p:nvSpPr>
+          <p:cNvPr id="10" name="CuadroTexto 9"/>
+          <p:cNvSpPr txBox="1"/>
+          <p:nvPr/>
+        </p:nvSpPr>
+        <p:spPr>
+          <a:xfrm>
+            <a:off x="2832553" y="3984873"/>
+            <a:ext cx="4020383" cy="1938992"/>
+          </a:xfrm>
+          <a:prstGeom prst="rect">
+            <a:avLst/>
+          </a:prstGeom>
+          <a:noFill/>
+        </p:spPr>
+        <p:txBody>
+          <a:bodyPr wrap="square" rtlCol="0">
+            <a:spAutoFit/>
+          </a:bodyPr>
+          <a:lstStyle/>
+          <a:p>
+            <a:r>
+              <a:rPr lang="en-AU" sz="1200" b="1" dirty="0" smtClean="0"/>
+              <a:t>Rights:</a:t>
+            </a:r>
+          </a:p>
+          <a:p>
+            <a:pPr marL="171450" indent="-171450">
+              <a:buFont typeface="Arial" charset="0"/>
+              <a:buChar char="•"/>
+            </a:pPr>
+            <a:r>
+              <a:rPr lang="en-AU" sz="1200" dirty="0" smtClean="0"/>
+              <a:t>Trip and Bicycle have a </a:t>
+            </a:r>
+            <a:r>
+              <a:rPr lang="en-AU" sz="1200" b="1" dirty="0" smtClean="0"/>
+              <a:t>single responsibility.</a:t>
+            </a:r>
+          </a:p>
+          <a:p>
+            <a:endParaRPr lang="en-AU" sz="1200" dirty="0" smtClean="0"/>
+          </a:p>
+          <a:p>
+            <a:r>
+              <a:rPr lang="en-AU" sz="1200" b="1" dirty="0" smtClean="0"/>
+              <a:t>Wrongs:</a:t>
+            </a:r>
+          </a:p>
+          <a:p>
+            <a:pPr marL="171450" indent="-171450">
+              <a:buFont typeface="Arial" charset="0"/>
+              <a:buChar char="•"/>
+            </a:pPr>
+            <a:r>
+              <a:rPr lang="en-AU" sz="1200" dirty="0" smtClean="0"/>
+              <a:t>Customer has </a:t>
+            </a:r>
+            <a:r>
+              <a:rPr lang="en-AU" sz="1200" b="1" dirty="0" smtClean="0"/>
+              <a:t>too much responsibility</a:t>
+            </a:r>
+          </a:p>
+          <a:p>
+            <a:pPr marL="363538" lvl="1" indent="-165100">
+              <a:buFont typeface="Arial" charset="0"/>
+              <a:buChar char="•"/>
+            </a:pPr>
+            <a:r>
+              <a:rPr lang="en-AU" sz="1200" dirty="0" smtClean="0"/>
+              <a:t>Customer </a:t>
+            </a:r>
+            <a:r>
+              <a:rPr lang="en-AU" sz="1200" b="1" dirty="0" smtClean="0"/>
+              <a:t>knows too much</a:t>
+            </a:r>
+            <a:r>
+              <a:rPr lang="en-AU" sz="1200" dirty="0" smtClean="0"/>
+              <a:t> about what makes a trip suitable</a:t>
+            </a:r>
+          </a:p>
+          <a:p>
+            <a:pPr marL="171450" indent="-171450">
+              <a:buFont typeface="Arial" charset="0"/>
+              <a:buChar char="•"/>
+            </a:pPr>
+            <a:r>
+              <a:rPr lang="en-AU" sz="1200" dirty="0" smtClean="0"/>
+              <a:t>Customer has </a:t>
+            </a:r>
+            <a:r>
+              <a:rPr lang="en-AU" sz="1200" b="1" dirty="0" smtClean="0"/>
+              <a:t>too much context </a:t>
+            </a:r>
+            <a:r>
+              <a:rPr lang="en-AU" sz="1200" dirty="0" smtClean="0"/>
+              <a:t>(needs both Trip and Bicycle to work).</a:t>
+            </a:r>
+          </a:p>
+          <a:p>
+            <a:pPr marL="171450" indent="-171450">
+              <a:buFont typeface="Arial" charset="0"/>
+              <a:buChar char="•"/>
+            </a:pPr>
+            <a:endParaRPr lang="en-AU" sz="1200" dirty="0" smtClean="0"/>
+          </a:p>
+        </p:txBody>
+      </p:sp>
+      <p:sp>
+        <p:nvSpPr>
+          <p:cNvPr id="16" name="CuadroTexto 15"/>
+          <p:cNvSpPr txBox="1"/>
+          <p:nvPr/>
+        </p:nvSpPr>
+        <p:spPr>
+          <a:xfrm>
+            <a:off x="6786028" y="4839629"/>
+            <a:ext cx="3431651" cy="830997"/>
+          </a:xfrm>
+          <a:prstGeom prst="rect">
+            <a:avLst/>
+          </a:prstGeom>
+          <a:noFill/>
+        </p:spPr>
+        <p:txBody>
+          <a:bodyPr wrap="square" rtlCol="0">
+            <a:spAutoFit/>
+          </a:bodyPr>
+          <a:lstStyle/>
+          <a:p>
+            <a:r>
+              <a:rPr lang="en-AU" sz="1200" b="1" dirty="0" smtClean="0"/>
+              <a:t>Rights:</a:t>
+            </a:r>
+          </a:p>
+          <a:p>
+            <a:pPr marL="171450" indent="-171450">
+              <a:buFont typeface="Arial" charset="0"/>
+              <a:buChar char="•"/>
+            </a:pPr>
+            <a:r>
+              <a:rPr lang="en-AU" sz="1200" dirty="0" smtClean="0"/>
+              <a:t>Discovered hidden class </a:t>
+            </a:r>
+            <a:r>
+              <a:rPr lang="en-AU" sz="1200" i="1" dirty="0" err="1" smtClean="0"/>
+              <a:t>TripFinder</a:t>
+            </a:r>
+            <a:endParaRPr lang="en-AU" sz="1200" i="1" dirty="0" smtClean="0"/>
+          </a:p>
+          <a:p>
+            <a:pPr marL="171450" indent="-171450">
+              <a:buFont typeface="Arial" charset="0"/>
+              <a:buChar char="•"/>
+            </a:pPr>
+            <a:r>
+              <a:rPr lang="en-AU" sz="1200" dirty="0" smtClean="0"/>
+              <a:t>All classes have single responsibility</a:t>
+            </a:r>
+          </a:p>
+          <a:p>
+            <a:pPr marL="171450" indent="-171450">
+              <a:buFont typeface="Arial" charset="0"/>
+              <a:buChar char="•"/>
+            </a:pPr>
+            <a:r>
+              <a:rPr lang="en-AU" sz="1200" dirty="0" smtClean="0"/>
+              <a:t>Only </a:t>
+            </a:r>
+            <a:r>
+              <a:rPr lang="en-AU" sz="1200" i="1" dirty="0" err="1" smtClean="0"/>
+              <a:t>TripFinder</a:t>
+            </a:r>
+            <a:r>
+              <a:rPr lang="en-AU" sz="1200" dirty="0" smtClean="0"/>
+              <a:t> requires context</a:t>
+            </a:r>
+          </a:p>
+        </p:txBody>
+      </p:sp>
+      <p:grpSp>
+        <p:nvGrpSpPr>
+          <p:cNvPr id="20" name="Agrupar 19"/>
+          <p:cNvGrpSpPr/>
+          <p:nvPr/>
+        </p:nvGrpSpPr>
+        <p:grpSpPr>
+          <a:xfrm>
+            <a:off x="263602" y="100972"/>
+            <a:ext cx="2884983" cy="2904637"/>
+            <a:chOff x="263602" y="100972"/>
+            <a:chExt cx="2884983" cy="2904637"/>
+          </a:xfrm>
+        </p:grpSpPr>
+        <p:sp>
+          <p:nvSpPr>
+            <p:cNvPr id="6" name="CuadroTexto 5"/>
+            <p:cNvSpPr txBox="1"/>
+            <p:nvPr/>
+          </p:nvSpPr>
+          <p:spPr>
+            <a:xfrm>
+              <a:off x="263602" y="100972"/>
+              <a:ext cx="2884983" cy="338554"/>
+            </a:xfrm>
+            <a:prstGeom prst="rect">
+              <a:avLst/>
+            </a:prstGeom>
+            <a:noFill/>
+          </p:spPr>
+          <p:txBody>
+            <a:bodyPr wrap="square" rtlCol="0">
+              <a:spAutoFit/>
+            </a:bodyPr>
+            <a:lstStyle/>
+            <a:p>
+              <a:pPr algn="ctr"/>
+              <a:r>
+                <a:rPr lang="es-ES_tradnl" sz="1600" b="1" dirty="0" smtClean="0"/>
+                <a:t>NOVICE APPROACH 1</a:t>
+              </a:r>
+              <a:endParaRPr lang="es-ES_tradnl" sz="1600" b="1" dirty="0"/>
+            </a:p>
+          </p:txBody>
+        </p:sp>
+        <p:pic>
+          <p:nvPicPr>
+            <p:cNvPr id="3" name="Imagen 2"/>
+            <p:cNvPicPr>
+              <a:picLocks noChangeAspect="1"/>
+            </p:cNvPicPr>
+            <p:nvPr/>
+          </p:nvPicPr>
+          <p:blipFill>
+            <a:blip r:embed="rId2"/>
+            <a:stretch>
+              <a:fillRect/>
+            </a:stretch>
+          </p:blipFill>
+          <p:spPr>
+            <a:xfrm>
+              <a:off x="700132" y="517582"/>
+              <a:ext cx="2011923" cy="2488027"/>
+            </a:xfrm>
+            <a:prstGeom prst="rect">
+              <a:avLst/>
+            </a:prstGeom>
+          </p:spPr>
+        </p:pic>
+      </p:grpSp>
+      <p:grpSp>
+        <p:nvGrpSpPr>
+          <p:cNvPr id="19" name="Agrupar 18"/>
+          <p:cNvGrpSpPr/>
+          <p:nvPr/>
+        </p:nvGrpSpPr>
+        <p:grpSpPr>
+          <a:xfrm>
+            <a:off x="3515344" y="100972"/>
+            <a:ext cx="2884983" cy="3803387"/>
+            <a:chOff x="4485501" y="100972"/>
+            <a:chExt cx="2884983" cy="3803387"/>
+          </a:xfrm>
+        </p:grpSpPr>
+        <p:sp>
+          <p:nvSpPr>
+            <p:cNvPr id="9" name="CuadroTexto 8"/>
+            <p:cNvSpPr txBox="1"/>
+            <p:nvPr/>
+          </p:nvSpPr>
+          <p:spPr>
+            <a:xfrm>
+              <a:off x="4485501" y="100972"/>
+              <a:ext cx="2884983" cy="338554"/>
+            </a:xfrm>
+            <a:prstGeom prst="rect">
+              <a:avLst/>
+            </a:prstGeom>
+            <a:noFill/>
+          </p:spPr>
+          <p:txBody>
+            <a:bodyPr wrap="square" rtlCol="0">
+              <a:spAutoFit/>
+            </a:bodyPr>
+            <a:lstStyle/>
+            <a:p>
+              <a:pPr algn="ctr"/>
+              <a:r>
+                <a:rPr lang="es-ES_tradnl" sz="1600" b="1" dirty="0" smtClean="0"/>
+                <a:t>NOVICE APPROACH 2</a:t>
+              </a:r>
+              <a:endParaRPr lang="es-ES_tradnl" sz="1600" b="1" dirty="0"/>
+            </a:p>
+          </p:txBody>
+        </p:sp>
+        <p:pic>
+          <p:nvPicPr>
+            <p:cNvPr id="7" name="Imagen 6"/>
+            <p:cNvPicPr>
+              <a:picLocks noChangeAspect="1"/>
+            </p:cNvPicPr>
+            <p:nvPr/>
+          </p:nvPicPr>
+          <p:blipFill>
+            <a:blip r:embed="rId3"/>
+            <a:stretch>
+              <a:fillRect/>
+            </a:stretch>
+          </p:blipFill>
+          <p:spPr>
+            <a:xfrm>
+              <a:off x="4574655" y="517582"/>
+              <a:ext cx="2706674" cy="3386777"/>
+            </a:xfrm>
+            <a:prstGeom prst="rect">
+              <a:avLst/>
+            </a:prstGeom>
+          </p:spPr>
+        </p:pic>
+      </p:grpSp>
+      <p:grpSp>
+        <p:nvGrpSpPr>
+          <p:cNvPr id="18" name="Agrupar 17"/>
+          <p:cNvGrpSpPr/>
+          <p:nvPr/>
+        </p:nvGrpSpPr>
+        <p:grpSpPr>
+          <a:xfrm>
+            <a:off x="6786028" y="100972"/>
+            <a:ext cx="3741049" cy="4738657"/>
+            <a:chOff x="7823093" y="100972"/>
+            <a:chExt cx="4042314" cy="5120259"/>
+          </a:xfrm>
+        </p:grpSpPr>
+        <p:sp>
+          <p:nvSpPr>
+            <p:cNvPr id="11" name="CuadroTexto 10"/>
+            <p:cNvSpPr txBox="1"/>
+            <p:nvPr/>
+          </p:nvSpPr>
+          <p:spPr>
+            <a:xfrm>
+              <a:off x="8401759" y="100972"/>
+              <a:ext cx="2884983" cy="338554"/>
+            </a:xfrm>
+            <a:prstGeom prst="rect">
+              <a:avLst/>
+            </a:prstGeom>
+            <a:noFill/>
+          </p:spPr>
+          <p:txBody>
+            <a:bodyPr wrap="square" rtlCol="0">
+              <a:spAutoFit/>
+            </a:bodyPr>
+            <a:lstStyle/>
+            <a:p>
+              <a:pPr algn="ctr"/>
+              <a:r>
+                <a:rPr lang="es-ES_tradnl" sz="1600" b="1" dirty="0" smtClean="0"/>
+                <a:t>EXPERIENCED DESIGNER</a:t>
+              </a:r>
+              <a:endParaRPr lang="es-ES_tradnl" sz="1600" b="1" dirty="0"/>
+            </a:p>
+          </p:txBody>
+        </p:sp>
+        <p:pic>
+          <p:nvPicPr>
+            <p:cNvPr id="17" name="Imagen 16"/>
+            <p:cNvPicPr>
+              <a:picLocks noChangeAspect="1"/>
+            </p:cNvPicPr>
+            <p:nvPr/>
+          </p:nvPicPr>
+          <p:blipFill>
+            <a:blip r:embed="rId4"/>
+            <a:stretch>
+              <a:fillRect/>
+            </a:stretch>
+          </p:blipFill>
+          <p:spPr>
+            <a:xfrm>
+              <a:off x="7823093" y="517582"/>
+              <a:ext cx="4042314" cy="4703649"/>
+            </a:xfrm>
+            <a:prstGeom prst="rect">
+              <a:avLst/>
+            </a:prstGeom>
+          </p:spPr>
+        </p:pic>
+      </p:grpSp>
+    </p:spTree>
+    <p:extLst>
+      <p:ext uri="{BB962C8B-B14F-4D97-AF65-F5344CB8AC3E}">
+        <p14:creationId xmlns:p14="http://schemas.microsoft.com/office/powerpoint/2010/main" val="457777310"/>
       </p:ext>
     </p:extLst>
   </p:cSld>

</xml_diff>

<commit_message>
add Law of Demeter to summary. Finish chapter 4
</commit_message>
<xml_diff>
--- a/images_editables/poodr_image_editables.pptx
+++ b/images_editables/poodr_image_editables.pptx
@@ -3779,10 +3779,9 @@
               <a:t>Discovered hidden class </a:t>
             </a:r>
             <a:r>
-              <a:rPr lang="en-AU" sz="1200" i="1" dirty="0" err="1" smtClean="0"/>
+              <a:rPr lang="en-AU" sz="1200" i="1" dirty="0" smtClean="0"/>
               <a:t>TripFinder</a:t>
             </a:r>
-            <a:endParaRPr lang="en-AU" sz="1200" i="1" dirty="0" smtClean="0"/>
           </a:p>
           <a:p>
             <a:pPr marL="171450" indent="-171450">
@@ -3804,7 +3803,7 @@
               <a:t>Only </a:t>
             </a:r>
             <a:r>
-              <a:rPr lang="en-AU" sz="1200" i="1" dirty="0" err="1" smtClean="0"/>
+              <a:rPr lang="en-AU" sz="1200" i="1" dirty="0" smtClean="0"/>
               <a:t>TripFinder</a:t>
             </a:r>
             <a:r>

</xml_diff>

<commit_message>
ch5 recognizing hidden ducks
</commit_message>
<xml_diff>
--- a/images_editables/poodr_image_editables.pptx
+++ b/images_editables/poodr_image_editables.pptx
@@ -7,6 +7,7 @@
   <p:sldIdLst>
     <p:sldId id="256" r:id="rId2"/>
     <p:sldId id="257" r:id="rId3"/>
+    <p:sldId id="258" r:id="rId4"/>
   </p:sldIdLst>
   <p:sldSz cx="12192000" cy="6858000"/>
   <p:notesSz cx="6858000" cy="9144000"/>
@@ -105,6 +106,11 @@
       </a:defRPr>
     </a:lvl9pPr>
   </p:defaultTextStyle>
+  <p:extLst>
+    <p:ext uri="{EFAFB233-063F-42B5-8137-9DF3F51BA10A}">
+      <p15:sldGuideLst xmlns:p15="http://schemas.microsoft.com/office/powerpoint/2012/main"/>
+    </p:ext>
+  </p:extLst>
 </p:presentation>
 </file>
 
@@ -239,7 +245,7 @@
           <a:p>
             <a:fld id="{5A099FB3-281E-FE4B-9038-CDEC87428BE8}" type="datetimeFigureOut">
               <a:rPr lang="es-ES_tradnl" smtClean="0"/>
-              <a:t>3/7/16</a:t>
+              <a:t>31/7/16</a:t>
             </a:fld>
             <a:endParaRPr lang="es-ES_tradnl"/>
           </a:p>
@@ -409,7 +415,7 @@
           <a:p>
             <a:fld id="{5A099FB3-281E-FE4B-9038-CDEC87428BE8}" type="datetimeFigureOut">
               <a:rPr lang="es-ES_tradnl" smtClean="0"/>
-              <a:t>3/7/16</a:t>
+              <a:t>31/7/16</a:t>
             </a:fld>
             <a:endParaRPr lang="es-ES_tradnl"/>
           </a:p>
@@ -589,7 +595,7 @@
           <a:p>
             <a:fld id="{5A099FB3-281E-FE4B-9038-CDEC87428BE8}" type="datetimeFigureOut">
               <a:rPr lang="es-ES_tradnl" smtClean="0"/>
-              <a:t>3/7/16</a:t>
+              <a:t>31/7/16</a:t>
             </a:fld>
             <a:endParaRPr lang="es-ES_tradnl"/>
           </a:p>
@@ -759,7 +765,7 @@
           <a:p>
             <a:fld id="{5A099FB3-281E-FE4B-9038-CDEC87428BE8}" type="datetimeFigureOut">
               <a:rPr lang="es-ES_tradnl" smtClean="0"/>
-              <a:t>3/7/16</a:t>
+              <a:t>31/7/16</a:t>
             </a:fld>
             <a:endParaRPr lang="es-ES_tradnl"/>
           </a:p>
@@ -1005,7 +1011,7 @@
           <a:p>
             <a:fld id="{5A099FB3-281E-FE4B-9038-CDEC87428BE8}" type="datetimeFigureOut">
               <a:rPr lang="es-ES_tradnl" smtClean="0"/>
-              <a:t>3/7/16</a:t>
+              <a:t>31/7/16</a:t>
             </a:fld>
             <a:endParaRPr lang="es-ES_tradnl"/>
           </a:p>
@@ -1237,7 +1243,7 @@
           <a:p>
             <a:fld id="{5A099FB3-281E-FE4B-9038-CDEC87428BE8}" type="datetimeFigureOut">
               <a:rPr lang="es-ES_tradnl" smtClean="0"/>
-              <a:t>3/7/16</a:t>
+              <a:t>31/7/16</a:t>
             </a:fld>
             <a:endParaRPr lang="es-ES_tradnl"/>
           </a:p>
@@ -1604,7 +1610,7 @@
           <a:p>
             <a:fld id="{5A099FB3-281E-FE4B-9038-CDEC87428BE8}" type="datetimeFigureOut">
               <a:rPr lang="es-ES_tradnl" smtClean="0"/>
-              <a:t>3/7/16</a:t>
+              <a:t>31/7/16</a:t>
             </a:fld>
             <a:endParaRPr lang="es-ES_tradnl"/>
           </a:p>
@@ -1722,7 +1728,7 @@
           <a:p>
             <a:fld id="{5A099FB3-281E-FE4B-9038-CDEC87428BE8}" type="datetimeFigureOut">
               <a:rPr lang="es-ES_tradnl" smtClean="0"/>
-              <a:t>3/7/16</a:t>
+              <a:t>31/7/16</a:t>
             </a:fld>
             <a:endParaRPr lang="es-ES_tradnl"/>
           </a:p>
@@ -1817,7 +1823,7 @@
           <a:p>
             <a:fld id="{5A099FB3-281E-FE4B-9038-CDEC87428BE8}" type="datetimeFigureOut">
               <a:rPr lang="es-ES_tradnl" smtClean="0"/>
-              <a:t>3/7/16</a:t>
+              <a:t>31/7/16</a:t>
             </a:fld>
             <a:endParaRPr lang="es-ES_tradnl"/>
           </a:p>
@@ -2094,7 +2100,7 @@
           <a:p>
             <a:fld id="{5A099FB3-281E-FE4B-9038-CDEC87428BE8}" type="datetimeFigureOut">
               <a:rPr lang="es-ES_tradnl" smtClean="0"/>
-              <a:t>3/7/16</a:t>
+              <a:t>31/7/16</a:t>
             </a:fld>
             <a:endParaRPr lang="es-ES_tradnl"/>
           </a:p>
@@ -2347,7 +2353,7 @@
           <a:p>
             <a:fld id="{5A099FB3-281E-FE4B-9038-CDEC87428BE8}" type="datetimeFigureOut">
               <a:rPr lang="es-ES_tradnl" smtClean="0"/>
-              <a:t>3/7/16</a:t>
+              <a:t>31/7/16</a:t>
             </a:fld>
             <a:endParaRPr lang="es-ES_tradnl"/>
           </a:p>
@@ -2560,7 +2566,7 @@
           <a:p>
             <a:fld id="{5A099FB3-281E-FE4B-9038-CDEC87428BE8}" type="datetimeFigureOut">
               <a:rPr lang="es-ES_tradnl" smtClean="0"/>
-              <a:t>3/7/16</a:t>
+              <a:t>31/7/16</a:t>
             </a:fld>
             <a:endParaRPr lang="es-ES_tradnl"/>
           </a:p>
@@ -3560,6 +3566,36 @@
           </a:p>
         </p:txBody>
       </p:sp>
+      <p:sp>
+        <p:nvSpPr>
+          <p:cNvPr id="3" name="CuadroTexto 2"/>
+          <p:cNvSpPr txBox="1"/>
+          <p:nvPr/>
+        </p:nvSpPr>
+        <p:spPr>
+          <a:xfrm>
+            <a:off x="11430000" y="6400802"/>
+            <a:ext cx="546945" cy="369332"/>
+          </a:xfrm>
+          <a:prstGeom prst="rect">
+            <a:avLst/>
+          </a:prstGeom>
+          <a:noFill/>
+        </p:spPr>
+        <p:txBody>
+          <a:bodyPr wrap="none" rtlCol="0">
+            <a:spAutoFit/>
+          </a:bodyPr>
+          <a:lstStyle/>
+          <a:p>
+            <a:r>
+              <a:rPr lang="es-ES_tradnl" dirty="0" smtClean="0"/>
+              <a:t>Ch4</a:t>
+            </a:r>
+            <a:endParaRPr lang="es-ES_tradnl" dirty="0"/>
+          </a:p>
+        </p:txBody>
+      </p:sp>
     </p:spTree>
     <p:extLst>
       <p:ext uri="{BB962C8B-B14F-4D97-AF65-F5344CB8AC3E}">
@@ -4023,10 +4059,203 @@
           </p:spPr>
         </p:pic>
       </p:grpSp>
+      <p:sp>
+        <p:nvSpPr>
+          <p:cNvPr id="14" name="CuadroTexto 13"/>
+          <p:cNvSpPr txBox="1"/>
+          <p:nvPr/>
+        </p:nvSpPr>
+        <p:spPr>
+          <a:xfrm>
+            <a:off x="11430000" y="6400802"/>
+            <a:ext cx="546945" cy="369332"/>
+          </a:xfrm>
+          <a:prstGeom prst="rect">
+            <a:avLst/>
+          </a:prstGeom>
+          <a:noFill/>
+        </p:spPr>
+        <p:txBody>
+          <a:bodyPr wrap="none" rtlCol="0">
+            <a:spAutoFit/>
+          </a:bodyPr>
+          <a:lstStyle/>
+          <a:p>
+            <a:r>
+              <a:rPr lang="es-ES_tradnl" dirty="0" smtClean="0"/>
+              <a:t>Ch4</a:t>
+            </a:r>
+            <a:endParaRPr lang="es-ES_tradnl" dirty="0"/>
+          </a:p>
+        </p:txBody>
+      </p:sp>
     </p:spTree>
     <p:extLst>
       <p:ext uri="{BB962C8B-B14F-4D97-AF65-F5344CB8AC3E}">
         <p14:creationId xmlns:p14="http://schemas.microsoft.com/office/powerpoint/2010/main" val="457777310"/>
+      </p:ext>
+    </p:extLst>
+  </p:cSld>
+  <p:clrMapOvr>
+    <a:masterClrMapping/>
+  </p:clrMapOvr>
+</p:sld>
+</file>
+
+<file path=ppt/slides/slide3.xml><?xml version="1.0" encoding="utf-8"?>
+<p:sld xmlns:a="http://schemas.openxmlformats.org/drawingml/2006/main" xmlns:r="http://schemas.openxmlformats.org/officeDocument/2006/relationships" xmlns:p="http://schemas.openxmlformats.org/presentationml/2006/main">
+  <p:cSld>
+    <p:spTree>
+      <p:nvGrpSpPr>
+        <p:cNvPr id="1" name=""/>
+        <p:cNvGrpSpPr/>
+        <p:nvPr/>
+      </p:nvGrpSpPr>
+      <p:grpSpPr>
+        <a:xfrm>
+          <a:off x="0" y="0"/>
+          <a:ext cx="0" cy="0"/>
+          <a:chOff x="0" y="0"/>
+          <a:chExt cx="0" cy="0"/>
+        </a:xfrm>
+      </p:grpSpPr>
+      <p:pic>
+        <p:nvPicPr>
+          <p:cNvPr id="2" name="Imagen 1"/>
+          <p:cNvPicPr>
+            <a:picLocks noChangeAspect="1"/>
+          </p:cNvPicPr>
+          <p:nvPr/>
+        </p:nvPicPr>
+        <p:blipFill>
+          <a:blip r:embed="rId2"/>
+          <a:stretch>
+            <a:fillRect/>
+          </a:stretch>
+        </p:blipFill>
+        <p:spPr>
+          <a:xfrm>
+            <a:off x="317346" y="437686"/>
+            <a:ext cx="4745308" cy="3932576"/>
+          </a:xfrm>
+          <a:prstGeom prst="rect">
+            <a:avLst/>
+          </a:prstGeom>
+        </p:spPr>
+      </p:pic>
+      <p:sp>
+        <p:nvSpPr>
+          <p:cNvPr id="15" name="CuadroTexto 14"/>
+          <p:cNvSpPr txBox="1"/>
+          <p:nvPr/>
+        </p:nvSpPr>
+        <p:spPr>
+          <a:xfrm>
+            <a:off x="11430000" y="6400802"/>
+            <a:ext cx="546945" cy="369332"/>
+          </a:xfrm>
+          <a:prstGeom prst="rect">
+            <a:avLst/>
+          </a:prstGeom>
+          <a:noFill/>
+        </p:spPr>
+        <p:txBody>
+          <a:bodyPr wrap="none" rtlCol="0">
+            <a:spAutoFit/>
+          </a:bodyPr>
+          <a:lstStyle/>
+          <a:p>
+            <a:r>
+              <a:rPr lang="es-ES_tradnl" dirty="0" smtClean="0"/>
+              <a:t>Ch5</a:t>
+            </a:r>
+            <a:endParaRPr lang="es-ES_tradnl" dirty="0"/>
+          </a:p>
+        </p:txBody>
+      </p:sp>
+      <p:sp>
+        <p:nvSpPr>
+          <p:cNvPr id="4" name="Cerrar llave 3"/>
+          <p:cNvSpPr/>
+          <p:nvPr/>
+        </p:nvSpPr>
+        <p:spPr>
+          <a:xfrm>
+            <a:off x="4861933" y="504592"/>
+            <a:ext cx="234175" cy="3810929"/>
+          </a:xfrm>
+          <a:prstGeom prst="rightBrace">
+            <a:avLst/>
+          </a:prstGeom>
+          <a:ln>
+            <a:solidFill>
+              <a:schemeClr val="tx1"/>
+            </a:solidFill>
+          </a:ln>
+        </p:spPr>
+        <p:style>
+          <a:lnRef idx="1">
+            <a:schemeClr val="accent1"/>
+          </a:lnRef>
+          <a:fillRef idx="0">
+            <a:schemeClr val="accent1"/>
+          </a:fillRef>
+          <a:effectRef idx="0">
+            <a:schemeClr val="accent1"/>
+          </a:effectRef>
+          <a:fontRef idx="minor">
+            <a:schemeClr val="tx1"/>
+          </a:fontRef>
+        </p:style>
+        <p:txBody>
+          <a:bodyPr rtlCol="0" anchor="ctr"/>
+          <a:lstStyle/>
+          <a:p>
+            <a:pPr algn="ctr"/>
+            <a:endParaRPr lang="es-ES_tradnl"/>
+          </a:p>
+        </p:txBody>
+      </p:sp>
+      <p:sp>
+        <p:nvSpPr>
+          <p:cNvPr id="8" name="CuadroTexto 7"/>
+          <p:cNvSpPr txBox="1"/>
+          <p:nvPr/>
+        </p:nvSpPr>
+        <p:spPr>
+          <a:xfrm>
+            <a:off x="5096108" y="2096431"/>
+            <a:ext cx="1000980" cy="646331"/>
+          </a:xfrm>
+          <a:prstGeom prst="rect">
+            <a:avLst/>
+          </a:prstGeom>
+          <a:noFill/>
+        </p:spPr>
+        <p:txBody>
+          <a:bodyPr wrap="none" rtlCol="0">
+            <a:spAutoFit/>
+          </a:bodyPr>
+          <a:lstStyle/>
+          <a:p>
+            <a:r>
+              <a:rPr lang="es-ES_tradnl" dirty="0" smtClean="0"/>
+              <a:t>Preparer</a:t>
+            </a:r>
+          </a:p>
+          <a:p>
+            <a:r>
+              <a:rPr lang="es-ES_tradnl" dirty="0" smtClean="0"/>
+              <a:t>Duck</a:t>
+            </a:r>
+            <a:endParaRPr lang="es-ES_tradnl" dirty="0"/>
+          </a:p>
+        </p:txBody>
+      </p:sp>
+    </p:spTree>
+    <p:extLst>
+      <p:ext uri="{BB962C8B-B14F-4D97-AF65-F5344CB8AC3E}">
+        <p14:creationId xmlns:p14="http://schemas.microsoft.com/office/powerpoint/2010/main" val="1164730303"/>
       </p:ext>
     </p:extLst>
   </p:cSld>

</xml_diff>

<commit_message>
write first 3 steps of the creating a role strategy process
</commit_message>
<xml_diff>
--- a/images_editables/poodr_image_editables.pptx
+++ b/images_editables/poodr_image_editables.pptx
@@ -8,6 +8,8 @@
     <p:sldId id="256" r:id="rId2"/>
     <p:sldId id="257" r:id="rId3"/>
     <p:sldId id="258" r:id="rId4"/>
+    <p:sldId id="259" r:id="rId5"/>
+    <p:sldId id="260" r:id="rId6"/>
   </p:sldIdLst>
   <p:sldSz cx="12192000" cy="6858000"/>
   <p:notesSz cx="6858000" cy="9144000"/>
@@ -245,7 +247,7 @@
           <a:p>
             <a:fld id="{5A099FB3-281E-FE4B-9038-CDEC87428BE8}" type="datetimeFigureOut">
               <a:rPr lang="es-ES_tradnl" smtClean="0"/>
-              <a:t>31/7/16</a:t>
+              <a:t>13/9/16</a:t>
             </a:fld>
             <a:endParaRPr lang="es-ES_tradnl"/>
           </a:p>
@@ -415,7 +417,7 @@
           <a:p>
             <a:fld id="{5A099FB3-281E-FE4B-9038-CDEC87428BE8}" type="datetimeFigureOut">
               <a:rPr lang="es-ES_tradnl" smtClean="0"/>
-              <a:t>31/7/16</a:t>
+              <a:t>13/9/16</a:t>
             </a:fld>
             <a:endParaRPr lang="es-ES_tradnl"/>
           </a:p>
@@ -595,7 +597,7 @@
           <a:p>
             <a:fld id="{5A099FB3-281E-FE4B-9038-CDEC87428BE8}" type="datetimeFigureOut">
               <a:rPr lang="es-ES_tradnl" smtClean="0"/>
-              <a:t>31/7/16</a:t>
+              <a:t>13/9/16</a:t>
             </a:fld>
             <a:endParaRPr lang="es-ES_tradnl"/>
           </a:p>
@@ -765,7 +767,7 @@
           <a:p>
             <a:fld id="{5A099FB3-281E-FE4B-9038-CDEC87428BE8}" type="datetimeFigureOut">
               <a:rPr lang="es-ES_tradnl" smtClean="0"/>
-              <a:t>31/7/16</a:t>
+              <a:t>13/9/16</a:t>
             </a:fld>
             <a:endParaRPr lang="es-ES_tradnl"/>
           </a:p>
@@ -1011,7 +1013,7 @@
           <a:p>
             <a:fld id="{5A099FB3-281E-FE4B-9038-CDEC87428BE8}" type="datetimeFigureOut">
               <a:rPr lang="es-ES_tradnl" smtClean="0"/>
-              <a:t>31/7/16</a:t>
+              <a:t>13/9/16</a:t>
             </a:fld>
             <a:endParaRPr lang="es-ES_tradnl"/>
           </a:p>
@@ -1243,7 +1245,7 @@
           <a:p>
             <a:fld id="{5A099FB3-281E-FE4B-9038-CDEC87428BE8}" type="datetimeFigureOut">
               <a:rPr lang="es-ES_tradnl" smtClean="0"/>
-              <a:t>31/7/16</a:t>
+              <a:t>13/9/16</a:t>
             </a:fld>
             <a:endParaRPr lang="es-ES_tradnl"/>
           </a:p>
@@ -1610,7 +1612,7 @@
           <a:p>
             <a:fld id="{5A099FB3-281E-FE4B-9038-CDEC87428BE8}" type="datetimeFigureOut">
               <a:rPr lang="es-ES_tradnl" smtClean="0"/>
-              <a:t>31/7/16</a:t>
+              <a:t>13/9/16</a:t>
             </a:fld>
             <a:endParaRPr lang="es-ES_tradnl"/>
           </a:p>
@@ -1728,7 +1730,7 @@
           <a:p>
             <a:fld id="{5A099FB3-281E-FE4B-9038-CDEC87428BE8}" type="datetimeFigureOut">
               <a:rPr lang="es-ES_tradnl" smtClean="0"/>
-              <a:t>31/7/16</a:t>
+              <a:t>13/9/16</a:t>
             </a:fld>
             <a:endParaRPr lang="es-ES_tradnl"/>
           </a:p>
@@ -1823,7 +1825,7 @@
           <a:p>
             <a:fld id="{5A099FB3-281E-FE4B-9038-CDEC87428BE8}" type="datetimeFigureOut">
               <a:rPr lang="es-ES_tradnl" smtClean="0"/>
-              <a:t>31/7/16</a:t>
+              <a:t>13/9/16</a:t>
             </a:fld>
             <a:endParaRPr lang="es-ES_tradnl"/>
           </a:p>
@@ -2100,7 +2102,7 @@
           <a:p>
             <a:fld id="{5A099FB3-281E-FE4B-9038-CDEC87428BE8}" type="datetimeFigureOut">
               <a:rPr lang="es-ES_tradnl" smtClean="0"/>
-              <a:t>31/7/16</a:t>
+              <a:t>13/9/16</a:t>
             </a:fld>
             <a:endParaRPr lang="es-ES_tradnl"/>
           </a:p>
@@ -2353,7 +2355,7 @@
           <a:p>
             <a:fld id="{5A099FB3-281E-FE4B-9038-CDEC87428BE8}" type="datetimeFigureOut">
               <a:rPr lang="es-ES_tradnl" smtClean="0"/>
-              <a:t>31/7/16</a:t>
+              <a:t>13/9/16</a:t>
             </a:fld>
             <a:endParaRPr lang="es-ES_tradnl"/>
           </a:p>
@@ -2566,7 +2568,7 @@
           <a:p>
             <a:fld id="{5A099FB3-281E-FE4B-9038-CDEC87428BE8}" type="datetimeFigureOut">
               <a:rPr lang="es-ES_tradnl" smtClean="0"/>
-              <a:t>31/7/16</a:t>
+              <a:t>13/9/16</a:t>
             </a:fld>
             <a:endParaRPr lang="es-ES_tradnl"/>
           </a:p>
@@ -4265,6 +4267,429 @@
 </p:sld>
 </file>
 
+<file path=ppt/slides/slide4.xml><?xml version="1.0" encoding="utf-8"?>
+<p:sld xmlns:a="http://schemas.openxmlformats.org/drawingml/2006/main" xmlns:r="http://schemas.openxmlformats.org/officeDocument/2006/relationships" xmlns:p="http://schemas.openxmlformats.org/presentationml/2006/main">
+  <p:cSld>
+    <p:spTree>
+      <p:nvGrpSpPr>
+        <p:cNvPr id="1" name=""/>
+        <p:cNvGrpSpPr/>
+        <p:nvPr/>
+      </p:nvGrpSpPr>
+      <p:grpSpPr>
+        <a:xfrm>
+          <a:off x="0" y="0"/>
+          <a:ext cx="0" cy="0"/>
+          <a:chOff x="0" y="0"/>
+          <a:chExt cx="0" cy="0"/>
+        </a:xfrm>
+      </p:grpSpPr>
+      <p:sp>
+        <p:nvSpPr>
+          <p:cNvPr id="15" name="CuadroTexto 14"/>
+          <p:cNvSpPr txBox="1"/>
+          <p:nvPr/>
+        </p:nvSpPr>
+        <p:spPr>
+          <a:xfrm>
+            <a:off x="11430000" y="6400802"/>
+            <a:ext cx="546945" cy="369332"/>
+          </a:xfrm>
+          <a:prstGeom prst="rect">
+            <a:avLst/>
+          </a:prstGeom>
+          <a:noFill/>
+        </p:spPr>
+        <p:txBody>
+          <a:bodyPr wrap="none" rtlCol="0">
+            <a:spAutoFit/>
+          </a:bodyPr>
+          <a:lstStyle/>
+          <a:p>
+            <a:r>
+              <a:rPr lang="es-ES_tradnl" dirty="0" smtClean="0"/>
+              <a:t>Ch7</a:t>
+            </a:r>
+            <a:endParaRPr lang="es-ES_tradnl" dirty="0"/>
+          </a:p>
+        </p:txBody>
+      </p:sp>
+      <p:pic>
+        <p:nvPicPr>
+          <p:cNvPr id="3" name="Imagen 2"/>
+          <p:cNvPicPr>
+            <a:picLocks noChangeAspect="1"/>
+          </p:cNvPicPr>
+          <p:nvPr/>
+        </p:nvPicPr>
+        <p:blipFill>
+          <a:blip r:embed="rId2"/>
+          <a:stretch>
+            <a:fillRect/>
+          </a:stretch>
+        </p:blipFill>
+        <p:spPr>
+          <a:xfrm>
+            <a:off x="89209" y="82793"/>
+            <a:ext cx="6110869" cy="6746489"/>
+          </a:xfrm>
+          <a:prstGeom prst="rect">
+            <a:avLst/>
+          </a:prstGeom>
+        </p:spPr>
+      </p:pic>
+      <p:sp>
+        <p:nvSpPr>
+          <p:cNvPr id="7" name="CuadroTexto 6"/>
+          <p:cNvSpPr txBox="1"/>
+          <p:nvPr/>
+        </p:nvSpPr>
+        <p:spPr>
+          <a:xfrm>
+            <a:off x="6200078" y="182307"/>
+            <a:ext cx="4020383" cy="1384995"/>
+          </a:xfrm>
+          <a:prstGeom prst="rect">
+            <a:avLst/>
+          </a:prstGeom>
+          <a:noFill/>
+        </p:spPr>
+        <p:txBody>
+          <a:bodyPr wrap="square" rtlCol="0">
+            <a:spAutoFit/>
+          </a:bodyPr>
+          <a:lstStyle/>
+          <a:p>
+            <a:r>
+              <a:rPr lang="en-AU" sz="1200" b="1" dirty="0" smtClean="0"/>
+              <a:t>Wrongs</a:t>
+            </a:r>
+            <a:r>
+              <a:rPr lang="en-AU" sz="1200" b="1" dirty="0" smtClean="0"/>
+              <a:t>:</a:t>
+            </a:r>
+          </a:p>
+          <a:p>
+            <a:pPr marL="171450" indent="-171450">
+              <a:buFont typeface="Arial" charset="0"/>
+              <a:buChar char="•"/>
+            </a:pPr>
+            <a:r>
+              <a:rPr lang="en-AU" sz="1200" b="1" dirty="0" smtClean="0"/>
+              <a:t>Class checking anti-pattern</a:t>
+            </a:r>
+            <a:endParaRPr lang="en-AU" sz="1200" dirty="0" smtClean="0"/>
+          </a:p>
+          <a:p>
+            <a:pPr marL="363538" lvl="1" indent="-165100">
+              <a:buFont typeface="Arial" charset="0"/>
+              <a:buChar char="•"/>
+            </a:pPr>
+            <a:r>
+              <a:rPr lang="en-AU" sz="1200" dirty="0" smtClean="0"/>
+              <a:t>Creates a highly dependent structure</a:t>
+            </a:r>
+          </a:p>
+          <a:p>
+            <a:pPr marL="363538" lvl="1" indent="-165100">
+              <a:buFont typeface="Arial" charset="0"/>
+              <a:buChar char="•"/>
+            </a:pPr>
+            <a:r>
+              <a:rPr lang="en-AU" sz="1200" dirty="0" smtClean="0"/>
+              <a:t>The knowledge of the lead days does not belong to Schedule.</a:t>
+            </a:r>
+          </a:p>
+          <a:p>
+            <a:pPr marL="363538" lvl="1" indent="-165100">
+              <a:buFont typeface="Arial" charset="0"/>
+              <a:buChar char="•"/>
+            </a:pPr>
+            <a:r>
+              <a:rPr lang="en-AU" sz="1200" dirty="0" smtClean="0"/>
+              <a:t>The knowledge of lead days belong the classes that Schedule is checking.</a:t>
+            </a:r>
+            <a:endParaRPr lang="en-AU" sz="1200" dirty="0" smtClean="0"/>
+          </a:p>
+        </p:txBody>
+      </p:sp>
+    </p:spTree>
+    <p:extLst>
+      <p:ext uri="{BB962C8B-B14F-4D97-AF65-F5344CB8AC3E}">
+        <p14:creationId xmlns:p14="http://schemas.microsoft.com/office/powerpoint/2010/main" val="1083369722"/>
+      </p:ext>
+    </p:extLst>
+  </p:cSld>
+  <p:clrMapOvr>
+    <a:masterClrMapping/>
+  </p:clrMapOvr>
+</p:sld>
+</file>
+
+<file path=ppt/slides/slide5.xml><?xml version="1.0" encoding="utf-8"?>
+<p:sld xmlns:a="http://schemas.openxmlformats.org/drawingml/2006/main" xmlns:r="http://schemas.openxmlformats.org/officeDocument/2006/relationships" xmlns:p="http://schemas.openxmlformats.org/presentationml/2006/main">
+  <p:cSld>
+    <p:spTree>
+      <p:nvGrpSpPr>
+        <p:cNvPr id="1" name=""/>
+        <p:cNvGrpSpPr/>
+        <p:nvPr/>
+      </p:nvGrpSpPr>
+      <p:grpSpPr>
+        <a:xfrm>
+          <a:off x="0" y="0"/>
+          <a:ext cx="0" cy="0"/>
+          <a:chOff x="0" y="0"/>
+          <a:chExt cx="0" cy="0"/>
+        </a:xfrm>
+      </p:grpSpPr>
+      <p:sp>
+        <p:nvSpPr>
+          <p:cNvPr id="15" name="CuadroTexto 14"/>
+          <p:cNvSpPr txBox="1"/>
+          <p:nvPr/>
+        </p:nvSpPr>
+        <p:spPr>
+          <a:xfrm>
+            <a:off x="11430000" y="6400802"/>
+            <a:ext cx="546945" cy="369332"/>
+          </a:xfrm>
+          <a:prstGeom prst="rect">
+            <a:avLst/>
+          </a:prstGeom>
+          <a:noFill/>
+        </p:spPr>
+        <p:txBody>
+          <a:bodyPr wrap="none" rtlCol="0">
+            <a:spAutoFit/>
+          </a:bodyPr>
+          <a:lstStyle/>
+          <a:p>
+            <a:r>
+              <a:rPr lang="es-ES_tradnl" dirty="0" smtClean="0"/>
+              <a:t>Ch7</a:t>
+            </a:r>
+            <a:endParaRPr lang="es-ES_tradnl" dirty="0"/>
+          </a:p>
+        </p:txBody>
+      </p:sp>
+      <p:sp>
+        <p:nvSpPr>
+          <p:cNvPr id="7" name="CuadroTexto 6"/>
+          <p:cNvSpPr txBox="1"/>
+          <p:nvPr/>
+        </p:nvSpPr>
+        <p:spPr>
+          <a:xfrm>
+            <a:off x="7531255" y="171156"/>
+            <a:ext cx="4020383" cy="1754326"/>
+          </a:xfrm>
+          <a:prstGeom prst="rect">
+            <a:avLst/>
+          </a:prstGeom>
+          <a:noFill/>
+        </p:spPr>
+        <p:txBody>
+          <a:bodyPr wrap="square" rtlCol="0">
+            <a:spAutoFit/>
+          </a:bodyPr>
+          <a:lstStyle/>
+          <a:p>
+            <a:r>
+              <a:rPr lang="en-AU" sz="1200" b="1" dirty="0" smtClean="0"/>
+              <a:t>Rights:</a:t>
+            </a:r>
+          </a:p>
+          <a:p>
+            <a:pPr marL="171450" indent="-171450">
+              <a:buFont typeface="Arial" charset="0"/>
+              <a:buChar char="•"/>
+            </a:pPr>
+            <a:r>
+              <a:rPr lang="en-AU" sz="1200" dirty="0" smtClean="0"/>
+              <a:t>Class checking anti-pattern has been removed.</a:t>
+            </a:r>
+          </a:p>
+          <a:p>
+            <a:pPr marL="171450" indent="-171450">
+              <a:buFont typeface="Arial" charset="0"/>
+              <a:buChar char="•"/>
+            </a:pPr>
+            <a:r>
+              <a:rPr lang="en-AU" sz="1200" i="1" dirty="0" smtClean="0"/>
+              <a:t>“schedulable” </a:t>
+            </a:r>
+            <a:r>
+              <a:rPr lang="en-AU" sz="1200" dirty="0" smtClean="0"/>
+              <a:t>duck type (role) has been discovered.</a:t>
+            </a:r>
+            <a:endParaRPr lang="en-AU" sz="1200" dirty="0"/>
+          </a:p>
+          <a:p>
+            <a:endParaRPr lang="en-AU" sz="1200" b="1" dirty="0" smtClean="0"/>
+          </a:p>
+          <a:p>
+            <a:r>
+              <a:rPr lang="en-AU" sz="1200" b="1" dirty="0" smtClean="0"/>
+              <a:t>Wrongs</a:t>
+            </a:r>
+            <a:r>
+              <a:rPr lang="en-AU" sz="1200" b="1" dirty="0" smtClean="0"/>
+              <a:t>:</a:t>
+            </a:r>
+          </a:p>
+          <a:p>
+            <a:pPr marL="171450" indent="-171450">
+              <a:buFont typeface="Arial" charset="0"/>
+              <a:buChar char="•"/>
+            </a:pPr>
+            <a:r>
+              <a:rPr lang="en-AU" sz="1200" i="1" dirty="0" smtClean="0"/>
+              <a:t>“schedulables” do not speak for themselves</a:t>
+            </a:r>
+            <a:r>
+              <a:rPr lang="en-AU" sz="1200" dirty="0" smtClean="0"/>
+              <a:t>.</a:t>
+            </a:r>
+            <a:endParaRPr lang="en-AU" sz="1200" dirty="0"/>
+          </a:p>
+          <a:p>
+            <a:pPr marL="628650" lvl="1" indent="-171450">
+              <a:buFont typeface="Arial" charset="0"/>
+              <a:buChar char="•"/>
+            </a:pPr>
+            <a:r>
+              <a:rPr lang="en-AU" sz="1200" dirty="0" smtClean="0"/>
+              <a:t>The Schedule is required as a middle man to find out something about the </a:t>
+            </a:r>
+            <a:r>
+              <a:rPr lang="en-AU" sz="1200" i="1" dirty="0" smtClean="0"/>
+              <a:t>”schedulable”.</a:t>
+            </a:r>
+          </a:p>
+          <a:p>
+            <a:pPr marL="628650" lvl="1" indent="-171450">
+              <a:buFont typeface="Arial" charset="0"/>
+              <a:buChar char="•"/>
+            </a:pPr>
+            <a:r>
+              <a:rPr lang="en-AU" sz="1200" dirty="0" smtClean="0"/>
+              <a:t>This creates a dependency.</a:t>
+            </a:r>
+            <a:endParaRPr lang="en-AU" sz="1200" dirty="0" smtClean="0"/>
+          </a:p>
+        </p:txBody>
+      </p:sp>
+      <p:pic>
+        <p:nvPicPr>
+          <p:cNvPr id="2" name="Imagen 1"/>
+          <p:cNvPicPr>
+            <a:picLocks noChangeAspect="1"/>
+          </p:cNvPicPr>
+          <p:nvPr/>
+        </p:nvPicPr>
+        <p:blipFill>
+          <a:blip r:embed="rId2"/>
+          <a:stretch>
+            <a:fillRect/>
+          </a:stretch>
+        </p:blipFill>
+        <p:spPr>
+          <a:xfrm>
+            <a:off x="177955" y="0"/>
+            <a:ext cx="7353300" cy="4305300"/>
+          </a:xfrm>
+          <a:prstGeom prst="rect">
+            <a:avLst/>
+          </a:prstGeom>
+        </p:spPr>
+      </p:pic>
+      <p:sp>
+        <p:nvSpPr>
+          <p:cNvPr id="6" name="CuadroTexto 5"/>
+          <p:cNvSpPr txBox="1"/>
+          <p:nvPr/>
+        </p:nvSpPr>
+        <p:spPr>
+          <a:xfrm>
+            <a:off x="7542408" y="3193645"/>
+            <a:ext cx="1645173" cy="646331"/>
+          </a:xfrm>
+          <a:prstGeom prst="rect">
+            <a:avLst/>
+          </a:prstGeom>
+          <a:noFill/>
+        </p:spPr>
+        <p:txBody>
+          <a:bodyPr wrap="square" rtlCol="0">
+            <a:spAutoFit/>
+          </a:bodyPr>
+          <a:lstStyle/>
+          <a:p>
+            <a:r>
+              <a:rPr lang="en-AU" sz="1200" b="1" smtClean="0"/>
+              <a:t>The discovered “</a:t>
+            </a:r>
+            <a:r>
+              <a:rPr lang="en-AU" sz="1200" b="1" i="1" smtClean="0"/>
+              <a:t>schedulable</a:t>
+            </a:r>
+            <a:r>
+              <a:rPr lang="en-AU" sz="1200" b="1" i="1" dirty="0" smtClean="0"/>
+              <a:t>” duck type (role)</a:t>
+            </a:r>
+            <a:endParaRPr lang="en-AU" sz="1200" b="1" dirty="0" smtClean="0"/>
+          </a:p>
+        </p:txBody>
+      </p:sp>
+      <p:cxnSp>
+        <p:nvCxnSpPr>
+          <p:cNvPr id="5" name="Conector recto de flecha 4"/>
+          <p:cNvCxnSpPr>
+            <a:endCxn id="6" idx="1"/>
+          </p:cNvCxnSpPr>
+          <p:nvPr/>
+        </p:nvCxnSpPr>
+        <p:spPr>
+          <a:xfrm>
+            <a:off x="7259446" y="3516810"/>
+            <a:ext cx="282962" cy="1"/>
+          </a:xfrm>
+          <a:prstGeom prst="straightConnector1">
+            <a:avLst/>
+          </a:prstGeom>
+          <a:ln>
+            <a:tailEnd type="triangle"/>
+          </a:ln>
+        </p:spPr>
+        <p:style>
+          <a:lnRef idx="1">
+            <a:schemeClr val="accent1"/>
+          </a:lnRef>
+          <a:fillRef idx="0">
+            <a:schemeClr val="accent1"/>
+          </a:fillRef>
+          <a:effectRef idx="0">
+            <a:schemeClr val="accent1"/>
+          </a:effectRef>
+          <a:fontRef idx="minor">
+            <a:schemeClr val="tx1"/>
+          </a:fontRef>
+        </p:style>
+      </p:cxnSp>
+    </p:spTree>
+    <p:extLst>
+      <p:ext uri="{BB962C8B-B14F-4D97-AF65-F5344CB8AC3E}">
+        <p14:creationId xmlns:p14="http://schemas.microsoft.com/office/powerpoint/2010/main" val="312816811"/>
+      </p:ext>
+    </p:extLst>
+  </p:cSld>
+  <p:clrMapOvr>
+    <a:masterClrMapping/>
+  </p:clrMapOvr>
+</p:sld>
+</file>
+
 <file path=ppt/theme/theme1.xml><?xml version="1.0" encoding="utf-8"?>
 <a:theme xmlns:a="http://schemas.openxmlformats.org/drawingml/2006/main" name="Tema de Office">
   <a:themeElements>

</xml_diff>

<commit_message>
finish chapter 7a and add chapter 7b
</commit_message>
<xml_diff>
--- a/images_editables/poodr_image_editables.pptx
+++ b/images_editables/poodr_image_editables.pptx
@@ -10,6 +10,9 @@
     <p:sldId id="258" r:id="rId4"/>
     <p:sldId id="259" r:id="rId5"/>
     <p:sldId id="260" r:id="rId6"/>
+    <p:sldId id="261" r:id="rId7"/>
+    <p:sldId id="262" r:id="rId8"/>
+    <p:sldId id="263" r:id="rId9"/>
   </p:sldIdLst>
   <p:sldSz cx="12192000" cy="6858000"/>
   <p:notesSz cx="6858000" cy="9144000"/>
@@ -247,7 +250,7 @@
           <a:p>
             <a:fld id="{5A099FB3-281E-FE4B-9038-CDEC87428BE8}" type="datetimeFigureOut">
               <a:rPr lang="es-ES_tradnl" smtClean="0"/>
-              <a:t>13/9/16</a:t>
+              <a:t>24/9/16</a:t>
             </a:fld>
             <a:endParaRPr lang="es-ES_tradnl"/>
           </a:p>
@@ -417,7 +420,7 @@
           <a:p>
             <a:fld id="{5A099FB3-281E-FE4B-9038-CDEC87428BE8}" type="datetimeFigureOut">
               <a:rPr lang="es-ES_tradnl" smtClean="0"/>
-              <a:t>13/9/16</a:t>
+              <a:t>24/9/16</a:t>
             </a:fld>
             <a:endParaRPr lang="es-ES_tradnl"/>
           </a:p>
@@ -597,7 +600,7 @@
           <a:p>
             <a:fld id="{5A099FB3-281E-FE4B-9038-CDEC87428BE8}" type="datetimeFigureOut">
               <a:rPr lang="es-ES_tradnl" smtClean="0"/>
-              <a:t>13/9/16</a:t>
+              <a:t>24/9/16</a:t>
             </a:fld>
             <a:endParaRPr lang="es-ES_tradnl"/>
           </a:p>
@@ -767,7 +770,7 @@
           <a:p>
             <a:fld id="{5A099FB3-281E-FE4B-9038-CDEC87428BE8}" type="datetimeFigureOut">
               <a:rPr lang="es-ES_tradnl" smtClean="0"/>
-              <a:t>13/9/16</a:t>
+              <a:t>24/9/16</a:t>
             </a:fld>
             <a:endParaRPr lang="es-ES_tradnl"/>
           </a:p>
@@ -1013,7 +1016,7 @@
           <a:p>
             <a:fld id="{5A099FB3-281E-FE4B-9038-CDEC87428BE8}" type="datetimeFigureOut">
               <a:rPr lang="es-ES_tradnl" smtClean="0"/>
-              <a:t>13/9/16</a:t>
+              <a:t>24/9/16</a:t>
             </a:fld>
             <a:endParaRPr lang="es-ES_tradnl"/>
           </a:p>
@@ -1245,7 +1248,7 @@
           <a:p>
             <a:fld id="{5A099FB3-281E-FE4B-9038-CDEC87428BE8}" type="datetimeFigureOut">
               <a:rPr lang="es-ES_tradnl" smtClean="0"/>
-              <a:t>13/9/16</a:t>
+              <a:t>24/9/16</a:t>
             </a:fld>
             <a:endParaRPr lang="es-ES_tradnl"/>
           </a:p>
@@ -1612,7 +1615,7 @@
           <a:p>
             <a:fld id="{5A099FB3-281E-FE4B-9038-CDEC87428BE8}" type="datetimeFigureOut">
               <a:rPr lang="es-ES_tradnl" smtClean="0"/>
-              <a:t>13/9/16</a:t>
+              <a:t>24/9/16</a:t>
             </a:fld>
             <a:endParaRPr lang="es-ES_tradnl"/>
           </a:p>
@@ -1730,7 +1733,7 @@
           <a:p>
             <a:fld id="{5A099FB3-281E-FE4B-9038-CDEC87428BE8}" type="datetimeFigureOut">
               <a:rPr lang="es-ES_tradnl" smtClean="0"/>
-              <a:t>13/9/16</a:t>
+              <a:t>24/9/16</a:t>
             </a:fld>
             <a:endParaRPr lang="es-ES_tradnl"/>
           </a:p>
@@ -1825,7 +1828,7 @@
           <a:p>
             <a:fld id="{5A099FB3-281E-FE4B-9038-CDEC87428BE8}" type="datetimeFigureOut">
               <a:rPr lang="es-ES_tradnl" smtClean="0"/>
-              <a:t>13/9/16</a:t>
+              <a:t>24/9/16</a:t>
             </a:fld>
             <a:endParaRPr lang="es-ES_tradnl"/>
           </a:p>
@@ -2102,7 +2105,7 @@
           <a:p>
             <a:fld id="{5A099FB3-281E-FE4B-9038-CDEC87428BE8}" type="datetimeFigureOut">
               <a:rPr lang="es-ES_tradnl" smtClean="0"/>
-              <a:t>13/9/16</a:t>
+              <a:t>24/9/16</a:t>
             </a:fld>
             <a:endParaRPr lang="es-ES_tradnl"/>
           </a:p>
@@ -2355,7 +2358,7 @@
           <a:p>
             <a:fld id="{5A099FB3-281E-FE4B-9038-CDEC87428BE8}" type="datetimeFigureOut">
               <a:rPr lang="es-ES_tradnl" smtClean="0"/>
-              <a:t>13/9/16</a:t>
+              <a:t>24/9/16</a:t>
             </a:fld>
             <a:endParaRPr lang="es-ES_tradnl"/>
           </a:p>
@@ -2568,7 +2571,7 @@
           <a:p>
             <a:fld id="{5A099FB3-281E-FE4B-9038-CDEC87428BE8}" type="datetimeFigureOut">
               <a:rPr lang="es-ES_tradnl" smtClean="0"/>
-              <a:t>13/9/16</a:t>
+              <a:t>24/9/16</a:t>
             </a:fld>
             <a:endParaRPr lang="es-ES_tradnl"/>
           </a:p>
@@ -4362,11 +4365,7 @@
           <a:p>
             <a:r>
               <a:rPr lang="en-AU" sz="1200" b="1" dirty="0" smtClean="0"/>
-              <a:t>Wrongs</a:t>
-            </a:r>
-            <a:r>
-              <a:rPr lang="en-AU" sz="1200" b="1" dirty="0" smtClean="0"/>
-              <a:t>:</a:t>
+              <a:t>Wrongs:</a:t>
             </a:r>
           </a:p>
           <a:p>
@@ -4409,7 +4408,6 @@
               <a:rPr lang="en-AU" sz="1200" dirty="0" smtClean="0"/>
               <a:t>The knowledge of lead days belong the classes that Schedule is checking.</a:t>
             </a:r>
-            <a:endParaRPr lang="en-AU" sz="1200" dirty="0" smtClean="0"/>
           </a:p>
         </p:txBody>
       </p:sp>
@@ -4531,11 +4529,7 @@
           <a:p>
             <a:r>
               <a:rPr lang="en-AU" sz="1200" b="1" dirty="0" smtClean="0"/>
-              <a:t>Wrongs</a:t>
-            </a:r>
-            <a:r>
-              <a:rPr lang="en-AU" sz="1200" b="1" dirty="0" smtClean="0"/>
-              <a:t>:</a:t>
+              <a:t>Wrongs:</a:t>
             </a:r>
           </a:p>
           <a:p>
@@ -4576,7 +4570,6 @@
               <a:rPr lang="en-AU" sz="1200" dirty="0" smtClean="0"/>
               <a:t>This creates a dependency.</a:t>
             </a:r>
-            <a:endParaRPr lang="en-AU" sz="1200" dirty="0" smtClean="0"/>
           </a:p>
         </p:txBody>
       </p:sp>
@@ -4681,6 +4674,780 @@
     <p:extLst>
       <p:ext uri="{BB962C8B-B14F-4D97-AF65-F5344CB8AC3E}">
         <p14:creationId xmlns:p14="http://schemas.microsoft.com/office/powerpoint/2010/main" val="312816811"/>
+      </p:ext>
+    </p:extLst>
+  </p:cSld>
+  <p:clrMapOvr>
+    <a:masterClrMapping/>
+  </p:clrMapOvr>
+</p:sld>
+</file>
+
+<file path=ppt/slides/slide6.xml><?xml version="1.0" encoding="utf-8"?>
+<p:sld xmlns:a="http://schemas.openxmlformats.org/drawingml/2006/main" xmlns:r="http://schemas.openxmlformats.org/officeDocument/2006/relationships" xmlns:p="http://schemas.openxmlformats.org/presentationml/2006/main">
+  <p:cSld>
+    <p:spTree>
+      <p:nvGrpSpPr>
+        <p:cNvPr id="1" name=""/>
+        <p:cNvGrpSpPr/>
+        <p:nvPr/>
+      </p:nvGrpSpPr>
+      <p:grpSpPr>
+        <a:xfrm>
+          <a:off x="0" y="0"/>
+          <a:ext cx="0" cy="0"/>
+          <a:chOff x="0" y="0"/>
+          <a:chExt cx="0" cy="0"/>
+        </a:xfrm>
+      </p:grpSpPr>
+      <p:sp>
+        <p:nvSpPr>
+          <p:cNvPr id="15" name="CuadroTexto 14"/>
+          <p:cNvSpPr txBox="1"/>
+          <p:nvPr/>
+        </p:nvSpPr>
+        <p:spPr>
+          <a:xfrm>
+            <a:off x="11430000" y="6400802"/>
+            <a:ext cx="546945" cy="369332"/>
+          </a:xfrm>
+          <a:prstGeom prst="rect">
+            <a:avLst/>
+          </a:prstGeom>
+          <a:noFill/>
+        </p:spPr>
+        <p:txBody>
+          <a:bodyPr wrap="none" rtlCol="0">
+            <a:spAutoFit/>
+          </a:bodyPr>
+          <a:lstStyle/>
+          <a:p>
+            <a:r>
+              <a:rPr lang="es-ES_tradnl" dirty="0" smtClean="0"/>
+              <a:t>Ch7</a:t>
+            </a:r>
+            <a:endParaRPr lang="es-ES_tradnl" dirty="0"/>
+          </a:p>
+        </p:txBody>
+      </p:sp>
+      <p:sp>
+        <p:nvSpPr>
+          <p:cNvPr id="7" name="CuadroTexto 6"/>
+          <p:cNvSpPr txBox="1"/>
+          <p:nvPr/>
+        </p:nvSpPr>
+        <p:spPr>
+          <a:xfrm>
+            <a:off x="7531255" y="171156"/>
+            <a:ext cx="2248365" cy="2123658"/>
+          </a:xfrm>
+          <a:prstGeom prst="rect">
+            <a:avLst/>
+          </a:prstGeom>
+          <a:noFill/>
+        </p:spPr>
+        <p:txBody>
+          <a:bodyPr wrap="square" rtlCol="0">
+            <a:spAutoFit/>
+          </a:bodyPr>
+          <a:lstStyle/>
+          <a:p>
+            <a:r>
+              <a:rPr lang="en-AU" sz="1200" b="1" dirty="0" smtClean="0"/>
+              <a:t>Rights:</a:t>
+            </a:r>
+          </a:p>
+          <a:p>
+            <a:pPr marL="171450" indent="-171450">
+              <a:buFont typeface="Arial" charset="0"/>
+              <a:buChar char="•"/>
+            </a:pPr>
+            <a:r>
+              <a:rPr lang="en-AU" sz="1200" dirty="0" smtClean="0"/>
+              <a:t>Bicycle speaks for itself.</a:t>
+            </a:r>
+          </a:p>
+          <a:p>
+            <a:pPr marL="171450" indent="-171450">
+              <a:buFont typeface="Arial" charset="0"/>
+              <a:buChar char="•"/>
+            </a:pPr>
+            <a:r>
+              <a:rPr lang="en-AU" sz="1200" dirty="0" smtClean="0"/>
+              <a:t>Instigating objects have no dependency on Schedule</a:t>
+            </a:r>
+          </a:p>
+          <a:p>
+            <a:pPr marL="171450" indent="-171450">
+              <a:buFont typeface="Arial" charset="0"/>
+              <a:buChar char="•"/>
+            </a:pPr>
+            <a:endParaRPr lang="en-AU" sz="1200" dirty="0"/>
+          </a:p>
+          <a:p>
+            <a:r>
+              <a:rPr lang="en-AU" sz="1200" b="1" dirty="0" smtClean="0"/>
+              <a:t>Wrongs:</a:t>
+            </a:r>
+          </a:p>
+          <a:p>
+            <a:pPr marL="171450" indent="-171450">
+              <a:buFont typeface="Arial" charset="0"/>
+              <a:buChar char="•"/>
+            </a:pPr>
+            <a:r>
+              <a:rPr lang="en-AU" sz="1200" dirty="0" smtClean="0"/>
+              <a:t>Bicycle is not the only thing that is </a:t>
+            </a:r>
+            <a:r>
+              <a:rPr lang="en-AU" sz="1200" i="1" dirty="0" smtClean="0"/>
+              <a:t>schedulable </a:t>
+            </a:r>
+            <a:r>
+              <a:rPr lang="en-AU" sz="1200" dirty="0" smtClean="0"/>
+              <a:t>in the app. The final design needs to take this into account.</a:t>
+            </a:r>
+          </a:p>
+          <a:p>
+            <a:pPr marL="171450" indent="-171450">
+              <a:buFont typeface="Arial" charset="0"/>
+              <a:buChar char="•"/>
+            </a:pPr>
+            <a:r>
+              <a:rPr lang="en-AU" sz="1200" dirty="0" smtClean="0"/>
+              <a:t>Bicycle depends on Schedule.</a:t>
+            </a:r>
+          </a:p>
+        </p:txBody>
+      </p:sp>
+      <p:pic>
+        <p:nvPicPr>
+          <p:cNvPr id="3" name="Imagen 2"/>
+          <p:cNvPicPr>
+            <a:picLocks noChangeAspect="1"/>
+          </p:cNvPicPr>
+          <p:nvPr/>
+        </p:nvPicPr>
+        <p:blipFill>
+          <a:blip r:embed="rId2"/>
+          <a:stretch>
+            <a:fillRect/>
+          </a:stretch>
+        </p:blipFill>
+        <p:spPr>
+          <a:xfrm>
+            <a:off x="164171" y="98479"/>
+            <a:ext cx="7095275" cy="3651471"/>
+          </a:xfrm>
+          <a:prstGeom prst="rect">
+            <a:avLst/>
+          </a:prstGeom>
+        </p:spPr>
+      </p:pic>
+    </p:spTree>
+    <p:extLst>
+      <p:ext uri="{BB962C8B-B14F-4D97-AF65-F5344CB8AC3E}">
+        <p14:creationId xmlns:p14="http://schemas.microsoft.com/office/powerpoint/2010/main" val="1430488902"/>
+      </p:ext>
+    </p:extLst>
+  </p:cSld>
+  <p:clrMapOvr>
+    <a:masterClrMapping/>
+  </p:clrMapOvr>
+</p:sld>
+</file>
+
+<file path=ppt/slides/slide7.xml><?xml version="1.0" encoding="utf-8"?>
+<p:sld xmlns:a="http://schemas.openxmlformats.org/drawingml/2006/main" xmlns:r="http://schemas.openxmlformats.org/officeDocument/2006/relationships" xmlns:p="http://schemas.openxmlformats.org/presentationml/2006/main">
+  <p:cSld>
+    <p:spTree>
+      <p:nvGrpSpPr>
+        <p:cNvPr id="1" name=""/>
+        <p:cNvGrpSpPr/>
+        <p:nvPr/>
+      </p:nvGrpSpPr>
+      <p:grpSpPr>
+        <a:xfrm>
+          <a:off x="0" y="0"/>
+          <a:ext cx="0" cy="0"/>
+          <a:chOff x="0" y="0"/>
+          <a:chExt cx="0" cy="0"/>
+        </a:xfrm>
+      </p:grpSpPr>
+      <p:sp>
+        <p:nvSpPr>
+          <p:cNvPr id="15" name="CuadroTexto 14"/>
+          <p:cNvSpPr txBox="1"/>
+          <p:nvPr/>
+        </p:nvSpPr>
+        <p:spPr>
+          <a:xfrm>
+            <a:off x="11430000" y="6400802"/>
+            <a:ext cx="546945" cy="369332"/>
+          </a:xfrm>
+          <a:prstGeom prst="rect">
+            <a:avLst/>
+          </a:prstGeom>
+          <a:noFill/>
+        </p:spPr>
+        <p:txBody>
+          <a:bodyPr wrap="none" rtlCol="0">
+            <a:spAutoFit/>
+          </a:bodyPr>
+          <a:lstStyle/>
+          <a:p>
+            <a:r>
+              <a:rPr lang="es-ES_tradnl" dirty="0" smtClean="0"/>
+              <a:t>Ch7</a:t>
+            </a:r>
+            <a:endParaRPr lang="es-ES_tradnl" dirty="0"/>
+          </a:p>
+        </p:txBody>
+      </p:sp>
+      <p:sp>
+        <p:nvSpPr>
+          <p:cNvPr id="7" name="CuadroTexto 6"/>
+          <p:cNvSpPr txBox="1"/>
+          <p:nvPr/>
+        </p:nvSpPr>
+        <p:spPr>
+          <a:xfrm>
+            <a:off x="7252475" y="171156"/>
+            <a:ext cx="2248365" cy="1938992"/>
+          </a:xfrm>
+          <a:prstGeom prst="rect">
+            <a:avLst/>
+          </a:prstGeom>
+          <a:noFill/>
+        </p:spPr>
+        <p:txBody>
+          <a:bodyPr wrap="square" rtlCol="0">
+            <a:spAutoFit/>
+          </a:bodyPr>
+          <a:lstStyle/>
+          <a:p>
+            <a:r>
+              <a:rPr lang="en-AU" sz="1200" b="1" dirty="0" smtClean="0"/>
+              <a:t>Rights:</a:t>
+            </a:r>
+          </a:p>
+          <a:p>
+            <a:pPr marL="171450" indent="-171450">
+              <a:buFont typeface="Arial" charset="0"/>
+              <a:buChar char="•"/>
+            </a:pPr>
+            <a:r>
+              <a:rPr lang="en-AU" sz="1200" i="1" dirty="0" smtClean="0"/>
+              <a:t>Schedulable </a:t>
+            </a:r>
+            <a:r>
+              <a:rPr lang="en-AU" sz="1200" dirty="0" smtClean="0"/>
+              <a:t>becomes an abstraction that many can implement.</a:t>
+            </a:r>
+          </a:p>
+          <a:p>
+            <a:pPr marL="171450" indent="-171450">
+              <a:buFont typeface="Arial" charset="0"/>
+              <a:buChar char="•"/>
+            </a:pPr>
+            <a:r>
+              <a:rPr lang="en-AU" sz="1200" dirty="0" smtClean="0"/>
+              <a:t>The abstraction uses the template method pattern to invite others to provide specializations.</a:t>
+            </a:r>
+            <a:endParaRPr lang="en-AU" sz="1200" dirty="0" smtClean="0"/>
+          </a:p>
+          <a:p>
+            <a:pPr marL="171450" indent="-171450">
+              <a:buFont typeface="Arial" charset="0"/>
+              <a:buChar char="•"/>
+            </a:pPr>
+            <a:r>
+              <a:rPr lang="en-AU" sz="1200" dirty="0" smtClean="0"/>
+              <a:t>The dependency on Schedule is isolated.</a:t>
+            </a:r>
+            <a:endParaRPr lang="en-AU" sz="1200" dirty="0" smtClean="0"/>
+          </a:p>
+        </p:txBody>
+      </p:sp>
+      <p:pic>
+        <p:nvPicPr>
+          <p:cNvPr id="2" name="Imagen 1"/>
+          <p:cNvPicPr>
+            <a:picLocks noChangeAspect="1"/>
+          </p:cNvPicPr>
+          <p:nvPr/>
+        </p:nvPicPr>
+        <p:blipFill>
+          <a:blip r:embed="rId2"/>
+          <a:stretch>
+            <a:fillRect/>
+          </a:stretch>
+        </p:blipFill>
+        <p:spPr>
+          <a:xfrm>
+            <a:off x="127929" y="0"/>
+            <a:ext cx="7213755" cy="3654441"/>
+          </a:xfrm>
+          <a:prstGeom prst="rect">
+            <a:avLst/>
+          </a:prstGeom>
+        </p:spPr>
+      </p:pic>
+    </p:spTree>
+    <p:extLst>
+      <p:ext uri="{BB962C8B-B14F-4D97-AF65-F5344CB8AC3E}">
+        <p14:creationId xmlns:p14="http://schemas.microsoft.com/office/powerpoint/2010/main" val="1681534409"/>
+      </p:ext>
+    </p:extLst>
+  </p:cSld>
+  <p:clrMapOvr>
+    <a:masterClrMapping/>
+  </p:clrMapOvr>
+</p:sld>
+</file>
+
+<file path=ppt/slides/slide8.xml><?xml version="1.0" encoding="utf-8"?>
+<p:sld xmlns:a="http://schemas.openxmlformats.org/drawingml/2006/main" xmlns:r="http://schemas.openxmlformats.org/officeDocument/2006/relationships" xmlns:p="http://schemas.openxmlformats.org/presentationml/2006/main">
+  <p:cSld>
+    <p:spTree>
+      <p:nvGrpSpPr>
+        <p:cNvPr id="1" name=""/>
+        <p:cNvGrpSpPr/>
+        <p:nvPr/>
+      </p:nvGrpSpPr>
+      <p:grpSpPr>
+        <a:xfrm>
+          <a:off x="0" y="0"/>
+          <a:ext cx="0" cy="0"/>
+          <a:chOff x="0" y="0"/>
+          <a:chExt cx="0" cy="0"/>
+        </a:xfrm>
+      </p:grpSpPr>
+      <p:pic>
+        <p:nvPicPr>
+          <p:cNvPr id="3" name="Imagen 2"/>
+          <p:cNvPicPr>
+            <a:picLocks noChangeAspect="1"/>
+          </p:cNvPicPr>
+          <p:nvPr/>
+        </p:nvPicPr>
+        <p:blipFill>
+          <a:blip r:embed="rId2"/>
+          <a:stretch>
+            <a:fillRect/>
+          </a:stretch>
+        </p:blipFill>
+        <p:spPr>
+          <a:xfrm>
+            <a:off x="2129881" y="0"/>
+            <a:ext cx="5730541" cy="6858000"/>
+          </a:xfrm>
+          <a:prstGeom prst="rect">
+            <a:avLst/>
+          </a:prstGeom>
+        </p:spPr>
+      </p:pic>
+      <p:sp>
+        <p:nvSpPr>
+          <p:cNvPr id="15" name="CuadroTexto 14"/>
+          <p:cNvSpPr txBox="1"/>
+          <p:nvPr/>
+        </p:nvSpPr>
+        <p:spPr>
+          <a:xfrm>
+            <a:off x="11430000" y="6400802"/>
+            <a:ext cx="546945" cy="369332"/>
+          </a:xfrm>
+          <a:prstGeom prst="rect">
+            <a:avLst/>
+          </a:prstGeom>
+          <a:noFill/>
+        </p:spPr>
+        <p:txBody>
+          <a:bodyPr wrap="none" rtlCol="0">
+            <a:spAutoFit/>
+          </a:bodyPr>
+          <a:lstStyle/>
+          <a:p>
+            <a:r>
+              <a:rPr lang="es-ES_tradnl" dirty="0" smtClean="0"/>
+              <a:t>Ch7</a:t>
+            </a:r>
+            <a:endParaRPr lang="es-ES_tradnl" dirty="0"/>
+          </a:p>
+        </p:txBody>
+      </p:sp>
+      <p:sp>
+        <p:nvSpPr>
+          <p:cNvPr id="7" name="CuadroTexto 6"/>
+          <p:cNvSpPr txBox="1"/>
+          <p:nvPr/>
+        </p:nvSpPr>
+        <p:spPr>
+          <a:xfrm>
+            <a:off x="5402645" y="5689194"/>
+            <a:ext cx="2248365" cy="461665"/>
+          </a:xfrm>
+          <a:prstGeom prst="rect">
+            <a:avLst/>
+          </a:prstGeom>
+          <a:noFill/>
+        </p:spPr>
+        <p:txBody>
+          <a:bodyPr wrap="square" rtlCol="0">
+            <a:spAutoFit/>
+          </a:bodyPr>
+          <a:lstStyle/>
+          <a:p>
+            <a:r>
+              <a:rPr lang="en-AU" sz="1200" b="1" dirty="0" smtClean="0"/>
+              <a:t>* </a:t>
+            </a:r>
+            <a:r>
+              <a:rPr lang="en-AU" sz="1200" dirty="0" smtClean="0"/>
+              <a:t>Reverse order of inclusion. Last included takes precedence</a:t>
+            </a:r>
+            <a:endParaRPr lang="en-AU" sz="1200" dirty="0" smtClean="0"/>
+          </a:p>
+        </p:txBody>
+      </p:sp>
+      <p:cxnSp>
+        <p:nvCxnSpPr>
+          <p:cNvPr id="5" name="Conector recto 4"/>
+          <p:cNvCxnSpPr/>
+          <p:nvPr/>
+        </p:nvCxnSpPr>
+        <p:spPr>
+          <a:xfrm>
+            <a:off x="5529358" y="1423764"/>
+            <a:ext cx="589144" cy="0"/>
+          </a:xfrm>
+          <a:prstGeom prst="line">
+            <a:avLst/>
+          </a:prstGeom>
+          <a:ln w="12700">
+            <a:solidFill>
+              <a:srgbClr val="FF0000"/>
+            </a:solidFill>
+          </a:ln>
+        </p:spPr>
+        <p:style>
+          <a:lnRef idx="1">
+            <a:schemeClr val="accent1"/>
+          </a:lnRef>
+          <a:fillRef idx="0">
+            <a:schemeClr val="accent1"/>
+          </a:fillRef>
+          <a:effectRef idx="0">
+            <a:schemeClr val="accent1"/>
+          </a:effectRef>
+          <a:fontRef idx="minor">
+            <a:schemeClr val="tx1"/>
+          </a:fontRef>
+        </p:style>
+      </p:cxnSp>
+      <p:cxnSp>
+        <p:nvCxnSpPr>
+          <p:cNvPr id="8" name="Conector recto 7"/>
+          <p:cNvCxnSpPr/>
+          <p:nvPr/>
+        </p:nvCxnSpPr>
+        <p:spPr>
+          <a:xfrm>
+            <a:off x="5529358" y="3079707"/>
+            <a:ext cx="589144" cy="0"/>
+          </a:xfrm>
+          <a:prstGeom prst="line">
+            <a:avLst/>
+          </a:prstGeom>
+          <a:ln w="12700">
+            <a:solidFill>
+              <a:srgbClr val="FF0000"/>
+            </a:solidFill>
+          </a:ln>
+        </p:spPr>
+        <p:style>
+          <a:lnRef idx="1">
+            <a:schemeClr val="accent1"/>
+          </a:lnRef>
+          <a:fillRef idx="0">
+            <a:schemeClr val="accent1"/>
+          </a:fillRef>
+          <a:effectRef idx="0">
+            <a:schemeClr val="accent1"/>
+          </a:effectRef>
+          <a:fontRef idx="minor">
+            <a:schemeClr val="tx1"/>
+          </a:fontRef>
+        </p:style>
+      </p:cxnSp>
+      <p:cxnSp>
+        <p:nvCxnSpPr>
+          <p:cNvPr id="9" name="Conector recto 8"/>
+          <p:cNvCxnSpPr/>
+          <p:nvPr/>
+        </p:nvCxnSpPr>
+        <p:spPr>
+          <a:xfrm>
+            <a:off x="6497967" y="4818871"/>
+            <a:ext cx="589144" cy="0"/>
+          </a:xfrm>
+          <a:prstGeom prst="line">
+            <a:avLst/>
+          </a:prstGeom>
+          <a:ln w="12700">
+            <a:solidFill>
+              <a:srgbClr val="FF0000"/>
+            </a:solidFill>
+          </a:ln>
+        </p:spPr>
+        <p:style>
+          <a:lnRef idx="1">
+            <a:schemeClr val="accent1"/>
+          </a:lnRef>
+          <a:fillRef idx="0">
+            <a:schemeClr val="accent1"/>
+          </a:fillRef>
+          <a:effectRef idx="0">
+            <a:schemeClr val="accent1"/>
+          </a:effectRef>
+          <a:fontRef idx="minor">
+            <a:schemeClr val="tx1"/>
+          </a:fontRef>
+        </p:style>
+      </p:cxnSp>
+      <p:cxnSp>
+        <p:nvCxnSpPr>
+          <p:cNvPr id="10" name="Conector recto 9"/>
+          <p:cNvCxnSpPr/>
+          <p:nvPr/>
+        </p:nvCxnSpPr>
+        <p:spPr>
+          <a:xfrm>
+            <a:off x="5958942" y="4621466"/>
+            <a:ext cx="833597" cy="0"/>
+          </a:xfrm>
+          <a:prstGeom prst="line">
+            <a:avLst/>
+          </a:prstGeom>
+          <a:ln w="12700">
+            <a:solidFill>
+              <a:srgbClr val="FF0000"/>
+            </a:solidFill>
+          </a:ln>
+        </p:spPr>
+        <p:style>
+          <a:lnRef idx="1">
+            <a:schemeClr val="accent1"/>
+          </a:lnRef>
+          <a:fillRef idx="0">
+            <a:schemeClr val="accent1"/>
+          </a:fillRef>
+          <a:effectRef idx="0">
+            <a:schemeClr val="accent1"/>
+          </a:effectRef>
+          <a:fontRef idx="minor">
+            <a:schemeClr val="tx1"/>
+          </a:fontRef>
+        </p:style>
+      </p:cxnSp>
+      <p:sp>
+        <p:nvSpPr>
+          <p:cNvPr id="12" name="CuadroTexto 11"/>
+          <p:cNvSpPr txBox="1"/>
+          <p:nvPr/>
+        </p:nvSpPr>
+        <p:spPr>
+          <a:xfrm>
+            <a:off x="5402645" y="1407144"/>
+            <a:ext cx="1255906" cy="261610"/>
+          </a:xfrm>
+          <a:prstGeom prst="rect">
+            <a:avLst/>
+          </a:prstGeom>
+          <a:noFill/>
+        </p:spPr>
+        <p:txBody>
+          <a:bodyPr wrap="square" rtlCol="0">
+            <a:spAutoFit/>
+          </a:bodyPr>
+          <a:lstStyle/>
+          <a:p>
+            <a:r>
+              <a:rPr lang="en-AU" sz="1050" dirty="0" smtClean="0"/>
+              <a:t>(for </a:t>
+            </a:r>
+            <a:r>
+              <a:rPr lang="en-AU" sz="1050" smtClean="0"/>
+              <a:t>all instances)</a:t>
+            </a:r>
+            <a:endParaRPr lang="en-AU" sz="1050" dirty="0" smtClean="0"/>
+          </a:p>
+        </p:txBody>
+      </p:sp>
+      <p:sp>
+        <p:nvSpPr>
+          <p:cNvPr id="13" name="CuadroTexto 12"/>
+          <p:cNvSpPr txBox="1"/>
+          <p:nvPr/>
+        </p:nvSpPr>
+        <p:spPr>
+          <a:xfrm>
+            <a:off x="5408782" y="3061296"/>
+            <a:ext cx="1255906" cy="261610"/>
+          </a:xfrm>
+          <a:prstGeom prst="rect">
+            <a:avLst/>
+          </a:prstGeom>
+          <a:noFill/>
+        </p:spPr>
+        <p:txBody>
+          <a:bodyPr wrap="square" rtlCol="0">
+            <a:spAutoFit/>
+          </a:bodyPr>
+          <a:lstStyle/>
+          <a:p>
+            <a:r>
+              <a:rPr lang="en-AU" sz="1050" dirty="0" smtClean="0"/>
+              <a:t>(for </a:t>
+            </a:r>
+            <a:r>
+              <a:rPr lang="en-AU" sz="1050" smtClean="0"/>
+              <a:t>all instances)</a:t>
+            </a:r>
+            <a:endParaRPr lang="en-AU" sz="1050" dirty="0" smtClean="0"/>
+          </a:p>
+        </p:txBody>
+      </p:sp>
+      <p:cxnSp>
+        <p:nvCxnSpPr>
+          <p:cNvPr id="14" name="Conector recto 13"/>
+          <p:cNvCxnSpPr/>
+          <p:nvPr/>
+        </p:nvCxnSpPr>
+        <p:spPr>
+          <a:xfrm>
+            <a:off x="7160754" y="5246408"/>
+            <a:ext cx="264910" cy="0"/>
+          </a:xfrm>
+          <a:prstGeom prst="line">
+            <a:avLst/>
+          </a:prstGeom>
+          <a:ln w="12700">
+            <a:solidFill>
+              <a:srgbClr val="FF0000"/>
+            </a:solidFill>
+          </a:ln>
+        </p:spPr>
+        <p:style>
+          <a:lnRef idx="1">
+            <a:schemeClr val="accent1"/>
+          </a:lnRef>
+          <a:fillRef idx="0">
+            <a:schemeClr val="accent1"/>
+          </a:fillRef>
+          <a:effectRef idx="0">
+            <a:schemeClr val="accent1"/>
+          </a:effectRef>
+          <a:fontRef idx="minor">
+            <a:schemeClr val="tx1"/>
+          </a:fontRef>
+        </p:style>
+      </p:cxnSp>
+      <p:sp>
+        <p:nvSpPr>
+          <p:cNvPr id="16" name="CuadroTexto 15"/>
+          <p:cNvSpPr txBox="1"/>
+          <p:nvPr/>
+        </p:nvSpPr>
+        <p:spPr>
+          <a:xfrm>
+            <a:off x="5051103" y="4150362"/>
+            <a:ext cx="2248365" cy="276999"/>
+          </a:xfrm>
+          <a:prstGeom prst="rect">
+            <a:avLst/>
+          </a:prstGeom>
+          <a:noFill/>
+        </p:spPr>
+        <p:txBody>
+          <a:bodyPr wrap="square" rtlCol="0">
+            <a:spAutoFit/>
+          </a:bodyPr>
+          <a:lstStyle/>
+          <a:p>
+            <a:r>
+              <a:rPr lang="en-AU" sz="1200" dirty="0" smtClean="0"/>
+              <a:t>*</a:t>
+            </a:r>
+            <a:endParaRPr lang="en-AU" sz="1200" dirty="0" smtClean="0"/>
+          </a:p>
+        </p:txBody>
+      </p:sp>
+      <p:sp>
+        <p:nvSpPr>
+          <p:cNvPr id="17" name="CuadroTexto 16"/>
+          <p:cNvSpPr txBox="1"/>
+          <p:nvPr/>
+        </p:nvSpPr>
+        <p:spPr>
+          <a:xfrm>
+            <a:off x="5069635" y="2459482"/>
+            <a:ext cx="2248365" cy="276999"/>
+          </a:xfrm>
+          <a:prstGeom prst="rect">
+            <a:avLst/>
+          </a:prstGeom>
+          <a:noFill/>
+        </p:spPr>
+        <p:txBody>
+          <a:bodyPr wrap="square" rtlCol="0">
+            <a:spAutoFit/>
+          </a:bodyPr>
+          <a:lstStyle/>
+          <a:p>
+            <a:r>
+              <a:rPr lang="en-AU" sz="1200" dirty="0" smtClean="0"/>
+              <a:t>*</a:t>
+            </a:r>
+            <a:endParaRPr lang="en-AU" sz="1200" dirty="0" smtClean="0"/>
+          </a:p>
+        </p:txBody>
+      </p:sp>
+      <p:sp>
+        <p:nvSpPr>
+          <p:cNvPr id="18" name="CuadroTexto 17"/>
+          <p:cNvSpPr txBox="1"/>
+          <p:nvPr/>
+        </p:nvSpPr>
+        <p:spPr>
+          <a:xfrm>
+            <a:off x="5069635" y="812511"/>
+            <a:ext cx="2248365" cy="276999"/>
+          </a:xfrm>
+          <a:prstGeom prst="rect">
+            <a:avLst/>
+          </a:prstGeom>
+          <a:noFill/>
+        </p:spPr>
+        <p:txBody>
+          <a:bodyPr wrap="square" rtlCol="0">
+            <a:spAutoFit/>
+          </a:bodyPr>
+          <a:lstStyle/>
+          <a:p>
+            <a:r>
+              <a:rPr lang="en-AU" sz="1200" dirty="0" smtClean="0"/>
+              <a:t>*</a:t>
+            </a:r>
+            <a:endParaRPr lang="en-AU" sz="1200" dirty="0" smtClean="0"/>
+          </a:p>
+        </p:txBody>
+      </p:sp>
+    </p:spTree>
+    <p:extLst>
+      <p:ext uri="{BB962C8B-B14F-4D97-AF65-F5344CB8AC3E}">
+        <p14:creationId xmlns:p14="http://schemas.microsoft.com/office/powerpoint/2010/main" val="339549316"/>
       </p:ext>
     </p:extLst>
   </p:cSld>

</xml_diff>

<commit_message>
create chapter 7c - writting inheritable code
</commit_message>
<xml_diff>
--- a/images_editables/poodr_image_editables.pptx
+++ b/images_editables/poodr_image_editables.pptx
@@ -13,6 +13,7 @@
     <p:sldId id="261" r:id="rId7"/>
     <p:sldId id="262" r:id="rId8"/>
     <p:sldId id="263" r:id="rId9"/>
+    <p:sldId id="264" r:id="rId10"/>
   </p:sldIdLst>
   <p:sldSz cx="12192000" cy="6858000"/>
   <p:notesSz cx="6858000" cy="9144000"/>
@@ -250,7 +251,7 @@
           <a:p>
             <a:fld id="{5A099FB3-281E-FE4B-9038-CDEC87428BE8}" type="datetimeFigureOut">
               <a:rPr lang="es-ES_tradnl" smtClean="0"/>
-              <a:t>24/9/16</a:t>
+              <a:t>25/9/16</a:t>
             </a:fld>
             <a:endParaRPr lang="es-ES_tradnl"/>
           </a:p>
@@ -420,7 +421,7 @@
           <a:p>
             <a:fld id="{5A099FB3-281E-FE4B-9038-CDEC87428BE8}" type="datetimeFigureOut">
               <a:rPr lang="es-ES_tradnl" smtClean="0"/>
-              <a:t>24/9/16</a:t>
+              <a:t>25/9/16</a:t>
             </a:fld>
             <a:endParaRPr lang="es-ES_tradnl"/>
           </a:p>
@@ -600,7 +601,7 @@
           <a:p>
             <a:fld id="{5A099FB3-281E-FE4B-9038-CDEC87428BE8}" type="datetimeFigureOut">
               <a:rPr lang="es-ES_tradnl" smtClean="0"/>
-              <a:t>24/9/16</a:t>
+              <a:t>25/9/16</a:t>
             </a:fld>
             <a:endParaRPr lang="es-ES_tradnl"/>
           </a:p>
@@ -770,7 +771,7 @@
           <a:p>
             <a:fld id="{5A099FB3-281E-FE4B-9038-CDEC87428BE8}" type="datetimeFigureOut">
               <a:rPr lang="es-ES_tradnl" smtClean="0"/>
-              <a:t>24/9/16</a:t>
+              <a:t>25/9/16</a:t>
             </a:fld>
             <a:endParaRPr lang="es-ES_tradnl"/>
           </a:p>
@@ -1016,7 +1017,7 @@
           <a:p>
             <a:fld id="{5A099FB3-281E-FE4B-9038-CDEC87428BE8}" type="datetimeFigureOut">
               <a:rPr lang="es-ES_tradnl" smtClean="0"/>
-              <a:t>24/9/16</a:t>
+              <a:t>25/9/16</a:t>
             </a:fld>
             <a:endParaRPr lang="es-ES_tradnl"/>
           </a:p>
@@ -1248,7 +1249,7 @@
           <a:p>
             <a:fld id="{5A099FB3-281E-FE4B-9038-CDEC87428BE8}" type="datetimeFigureOut">
               <a:rPr lang="es-ES_tradnl" smtClean="0"/>
-              <a:t>24/9/16</a:t>
+              <a:t>25/9/16</a:t>
             </a:fld>
             <a:endParaRPr lang="es-ES_tradnl"/>
           </a:p>
@@ -1615,7 +1616,7 @@
           <a:p>
             <a:fld id="{5A099FB3-281E-FE4B-9038-CDEC87428BE8}" type="datetimeFigureOut">
               <a:rPr lang="es-ES_tradnl" smtClean="0"/>
-              <a:t>24/9/16</a:t>
+              <a:t>25/9/16</a:t>
             </a:fld>
             <a:endParaRPr lang="es-ES_tradnl"/>
           </a:p>
@@ -1733,7 +1734,7 @@
           <a:p>
             <a:fld id="{5A099FB3-281E-FE4B-9038-CDEC87428BE8}" type="datetimeFigureOut">
               <a:rPr lang="es-ES_tradnl" smtClean="0"/>
-              <a:t>24/9/16</a:t>
+              <a:t>25/9/16</a:t>
             </a:fld>
             <a:endParaRPr lang="es-ES_tradnl"/>
           </a:p>
@@ -1828,7 +1829,7 @@
           <a:p>
             <a:fld id="{5A099FB3-281E-FE4B-9038-CDEC87428BE8}" type="datetimeFigureOut">
               <a:rPr lang="es-ES_tradnl" smtClean="0"/>
-              <a:t>24/9/16</a:t>
+              <a:t>25/9/16</a:t>
             </a:fld>
             <a:endParaRPr lang="es-ES_tradnl"/>
           </a:p>
@@ -2105,7 +2106,7 @@
           <a:p>
             <a:fld id="{5A099FB3-281E-FE4B-9038-CDEC87428BE8}" type="datetimeFigureOut">
               <a:rPr lang="es-ES_tradnl" smtClean="0"/>
-              <a:t>24/9/16</a:t>
+              <a:t>25/9/16</a:t>
             </a:fld>
             <a:endParaRPr lang="es-ES_tradnl"/>
           </a:p>
@@ -2358,7 +2359,7 @@
           <a:p>
             <a:fld id="{5A099FB3-281E-FE4B-9038-CDEC87428BE8}" type="datetimeFigureOut">
               <a:rPr lang="es-ES_tradnl" smtClean="0"/>
-              <a:t>24/9/16</a:t>
+              <a:t>25/9/16</a:t>
             </a:fld>
             <a:endParaRPr lang="es-ES_tradnl"/>
           </a:p>
@@ -2571,7 +2572,7 @@
           <a:p>
             <a:fld id="{5A099FB3-281E-FE4B-9038-CDEC87428BE8}" type="datetimeFigureOut">
               <a:rPr lang="es-ES_tradnl" smtClean="0"/>
-              <a:t>24/9/16</a:t>
+              <a:t>25/9/16</a:t>
             </a:fld>
             <a:endParaRPr lang="es-ES_tradnl"/>
           </a:p>
@@ -4954,7 +4955,6 @@
               <a:rPr lang="en-AU" sz="1200" dirty="0" smtClean="0"/>
               <a:t>The abstraction uses the template method pattern to invite others to provide specializations.</a:t>
             </a:r>
-            <a:endParaRPr lang="en-AU" sz="1200" dirty="0" smtClean="0"/>
           </a:p>
           <a:p>
             <a:pPr marL="171450" indent="-171450">
@@ -4965,7 +4965,6 @@
               <a:rPr lang="en-AU" sz="1200" dirty="0" smtClean="0"/>
               <a:t>The dependency on Schedule is isolated.</a:t>
             </a:r>
-            <a:endParaRPr lang="en-AU" sz="1200" dirty="0" smtClean="0"/>
           </a:p>
         </p:txBody>
       </p:sp>
@@ -5107,7 +5106,6 @@
               <a:rPr lang="en-AU" sz="1200" dirty="0" smtClean="0"/>
               <a:t>Reverse order of inclusion. Last included takes precedence</a:t>
             </a:r>
-            <a:endParaRPr lang="en-AU" sz="1200" dirty="0" smtClean="0"/>
           </a:p>
         </p:txBody>
       </p:sp>
@@ -5380,7 +5378,6 @@
               <a:rPr lang="en-AU" sz="1200" dirty="0" smtClean="0"/>
               <a:t>*</a:t>
             </a:r>
-            <a:endParaRPr lang="en-AU" sz="1200" dirty="0" smtClean="0"/>
           </a:p>
         </p:txBody>
       </p:sp>
@@ -5410,7 +5407,6 @@
               <a:rPr lang="en-AU" sz="1200" dirty="0" smtClean="0"/>
               <a:t>*</a:t>
             </a:r>
-            <a:endParaRPr lang="en-AU" sz="1200" dirty="0" smtClean="0"/>
           </a:p>
         </p:txBody>
       </p:sp>
@@ -5440,7 +5436,6 @@
               <a:rPr lang="en-AU" sz="1200" dirty="0" smtClean="0"/>
               <a:t>*</a:t>
             </a:r>
-            <a:endParaRPr lang="en-AU" sz="1200" dirty="0" smtClean="0"/>
           </a:p>
         </p:txBody>
       </p:sp>
@@ -5448,6 +5443,222 @@
     <p:extLst>
       <p:ext uri="{BB962C8B-B14F-4D97-AF65-F5344CB8AC3E}">
         <p14:creationId xmlns:p14="http://schemas.microsoft.com/office/powerpoint/2010/main" val="339549316"/>
+      </p:ext>
+    </p:extLst>
+  </p:cSld>
+  <p:clrMapOvr>
+    <a:masterClrMapping/>
+  </p:clrMapOvr>
+</p:sld>
+</file>
+
+<file path=ppt/slides/slide9.xml><?xml version="1.0" encoding="utf-8"?>
+<p:sld xmlns:a="http://schemas.openxmlformats.org/drawingml/2006/main" xmlns:r="http://schemas.openxmlformats.org/officeDocument/2006/relationships" xmlns:p="http://schemas.openxmlformats.org/presentationml/2006/main">
+  <p:cSld>
+    <p:spTree>
+      <p:nvGrpSpPr>
+        <p:cNvPr id="1" name=""/>
+        <p:cNvGrpSpPr/>
+        <p:nvPr/>
+      </p:nvGrpSpPr>
+      <p:grpSpPr>
+        <a:xfrm>
+          <a:off x="0" y="0"/>
+          <a:ext cx="0" cy="0"/>
+          <a:chOff x="0" y="0"/>
+          <a:chExt cx="0" cy="0"/>
+        </a:xfrm>
+      </p:grpSpPr>
+      <p:sp>
+        <p:nvSpPr>
+          <p:cNvPr id="15" name="CuadroTexto 14"/>
+          <p:cNvSpPr txBox="1"/>
+          <p:nvPr/>
+        </p:nvSpPr>
+        <p:spPr>
+          <a:xfrm>
+            <a:off x="11430000" y="6400802"/>
+            <a:ext cx="546945" cy="369332"/>
+          </a:xfrm>
+          <a:prstGeom prst="rect">
+            <a:avLst/>
+          </a:prstGeom>
+          <a:noFill/>
+        </p:spPr>
+        <p:txBody>
+          <a:bodyPr wrap="none" rtlCol="0">
+            <a:spAutoFit/>
+          </a:bodyPr>
+          <a:lstStyle/>
+          <a:p>
+            <a:r>
+              <a:rPr lang="es-ES_tradnl" dirty="0" smtClean="0"/>
+              <a:t>Ch7</a:t>
+            </a:r>
+            <a:endParaRPr lang="es-ES_tradnl" dirty="0"/>
+          </a:p>
+        </p:txBody>
+      </p:sp>
+      <p:pic>
+        <p:nvPicPr>
+          <p:cNvPr id="2" name="Imagen 1"/>
+          <p:cNvPicPr>
+            <a:picLocks noChangeAspect="1"/>
+          </p:cNvPicPr>
+          <p:nvPr/>
+        </p:nvPicPr>
+        <p:blipFill>
+          <a:blip r:embed="rId2"/>
+          <a:stretch>
+            <a:fillRect/>
+          </a:stretch>
+        </p:blipFill>
+        <p:spPr>
+          <a:xfrm>
+            <a:off x="1530350" y="768350"/>
+            <a:ext cx="6616700" cy="4610100"/>
+          </a:xfrm>
+          <a:prstGeom prst="rect">
+            <a:avLst/>
+          </a:prstGeom>
+        </p:spPr>
+      </p:pic>
+      <p:sp>
+        <p:nvSpPr>
+          <p:cNvPr id="4" name="CuadroTexto 3"/>
+          <p:cNvSpPr txBox="1"/>
+          <p:nvPr/>
+        </p:nvSpPr>
+        <p:spPr>
+          <a:xfrm>
+            <a:off x="3161323" y="946408"/>
+            <a:ext cx="598882" cy="369332"/>
+          </a:xfrm>
+          <a:prstGeom prst="rect">
+            <a:avLst/>
+          </a:prstGeom>
+          <a:noFill/>
+        </p:spPr>
+        <p:txBody>
+          <a:bodyPr wrap="none" rtlCol="0">
+            <a:spAutoFit/>
+          </a:bodyPr>
+          <a:lstStyle/>
+          <a:p>
+            <a:r>
+              <a:rPr lang="en-US" b="1" i="1" dirty="0" smtClean="0"/>
+              <a:t>Best</a:t>
+            </a:r>
+            <a:endParaRPr lang="en-US" b="1" i="1" dirty="0"/>
+          </a:p>
+        </p:txBody>
+      </p:sp>
+      <p:sp>
+        <p:nvSpPr>
+          <p:cNvPr id="19" name="CuadroTexto 18"/>
+          <p:cNvSpPr txBox="1"/>
+          <p:nvPr/>
+        </p:nvSpPr>
+        <p:spPr>
+          <a:xfrm>
+            <a:off x="6743700" y="946408"/>
+            <a:ext cx="702436" cy="369332"/>
+          </a:xfrm>
+          <a:prstGeom prst="rect">
+            <a:avLst/>
+          </a:prstGeom>
+          <a:noFill/>
+        </p:spPr>
+        <p:txBody>
+          <a:bodyPr wrap="none" rtlCol="0">
+            <a:spAutoFit/>
+          </a:bodyPr>
+          <a:lstStyle/>
+          <a:p>
+            <a:r>
+              <a:rPr lang="en-US" b="1" i="1" dirty="0" smtClean="0"/>
+              <a:t>Good</a:t>
+            </a:r>
+            <a:endParaRPr lang="en-US" b="1" i="1" dirty="0"/>
+          </a:p>
+        </p:txBody>
+      </p:sp>
+      <p:sp>
+        <p:nvSpPr>
+          <p:cNvPr id="20" name="CuadroTexto 19"/>
+          <p:cNvSpPr txBox="1"/>
+          <p:nvPr/>
+        </p:nvSpPr>
+        <p:spPr>
+          <a:xfrm>
+            <a:off x="3161323" y="2685405"/>
+            <a:ext cx="1462452" cy="646331"/>
+          </a:xfrm>
+          <a:prstGeom prst="rect">
+            <a:avLst/>
+          </a:prstGeom>
+          <a:noFill/>
+        </p:spPr>
+        <p:txBody>
+          <a:bodyPr wrap="none" rtlCol="0">
+            <a:spAutoFit/>
+          </a:bodyPr>
+          <a:lstStyle/>
+          <a:p>
+            <a:r>
+              <a:rPr lang="en-US" b="1" i="1" dirty="0" smtClean="0"/>
+              <a:t>Bad</a:t>
+            </a:r>
+          </a:p>
+          <a:p>
+            <a:r>
+              <a:rPr lang="en-US" b="1" i="1" dirty="0" smtClean="0"/>
+              <a:t>(Try to avoid)</a:t>
+            </a:r>
+            <a:endParaRPr lang="en-US" b="1" i="1" dirty="0"/>
+          </a:p>
+        </p:txBody>
+      </p:sp>
+      <p:sp>
+        <p:nvSpPr>
+          <p:cNvPr id="21" name="CuadroTexto 20"/>
+          <p:cNvSpPr txBox="1"/>
+          <p:nvPr/>
+        </p:nvSpPr>
+        <p:spPr>
+          <a:xfrm>
+            <a:off x="6743700" y="2685405"/>
+            <a:ext cx="1276760" cy="646331"/>
+          </a:xfrm>
+          <a:prstGeom prst="rect">
+            <a:avLst/>
+          </a:prstGeom>
+          <a:noFill/>
+        </p:spPr>
+        <p:txBody>
+          <a:bodyPr wrap="none" rtlCol="0">
+            <a:spAutoFit/>
+          </a:bodyPr>
+          <a:lstStyle/>
+          <a:p>
+            <a:r>
+              <a:rPr lang="en-US" b="1" i="1" dirty="0" smtClean="0"/>
+              <a:t>Worse</a:t>
+            </a:r>
+          </a:p>
+          <a:p>
+            <a:r>
+              <a:rPr lang="en-US" b="1" i="1" dirty="0" smtClean="0"/>
+              <a:t>(Avoid this)</a:t>
+            </a:r>
+            <a:endParaRPr lang="en-US" b="1" i="1" dirty="0"/>
+          </a:p>
+        </p:txBody>
+      </p:sp>
+    </p:spTree>
+    <p:extLst>
+      <p:ext uri="{BB962C8B-B14F-4D97-AF65-F5344CB8AC3E}">
+        <p14:creationId xmlns:p14="http://schemas.microsoft.com/office/powerpoint/2010/main" val="199005352"/>
       </p:ext>
     </p:extLst>
   </p:cSld>

</xml_diff>